<commit_message>
Version without foobar logo
</commit_message>
<xml_diff>
--- a/assets/launcher_icon.pptx
+++ b/assets/launcher_icon.pptx
@@ -7,8 +7,12 @@
   <p:sldIdLst>
     <p:sldId id="256" r:id="rId2"/>
     <p:sldId id="257" r:id="rId3"/>
-    <p:sldId id="258" r:id="rId4"/>
-    <p:sldId id="259" r:id="rId5"/>
+    <p:sldId id="260" r:id="rId4"/>
+    <p:sldId id="261" r:id="rId5"/>
+    <p:sldId id="263" r:id="rId6"/>
+    <p:sldId id="258" r:id="rId7"/>
+    <p:sldId id="259" r:id="rId8"/>
+    <p:sldId id="262" r:id="rId9"/>
   </p:sldIdLst>
   <p:sldSz cx="12192000" cy="6858000"/>
   <p:notesSz cx="6858000" cy="9144000"/>
@@ -262,7 +266,7 @@
           <a:p>
             <a:fld id="{7C169F67-FBE8-437D-8D9C-565492D9862F}" type="datetimeFigureOut">
               <a:rPr lang="de-DE" smtClean="0"/>
-              <a:t>07.05.2024</a:t>
+              <a:t>10.05.2024</a:t>
             </a:fld>
             <a:endParaRPr lang="de-DE"/>
           </a:p>
@@ -460,7 +464,7 @@
           <a:p>
             <a:fld id="{7C169F67-FBE8-437D-8D9C-565492D9862F}" type="datetimeFigureOut">
               <a:rPr lang="de-DE" smtClean="0"/>
-              <a:t>07.05.2024</a:t>
+              <a:t>10.05.2024</a:t>
             </a:fld>
             <a:endParaRPr lang="de-DE"/>
           </a:p>
@@ -668,7 +672,7 @@
           <a:p>
             <a:fld id="{7C169F67-FBE8-437D-8D9C-565492D9862F}" type="datetimeFigureOut">
               <a:rPr lang="de-DE" smtClean="0"/>
-              <a:t>07.05.2024</a:t>
+              <a:t>10.05.2024</a:t>
             </a:fld>
             <a:endParaRPr lang="de-DE"/>
           </a:p>
@@ -866,7 +870,7 @@
           <a:p>
             <a:fld id="{7C169F67-FBE8-437D-8D9C-565492D9862F}" type="datetimeFigureOut">
               <a:rPr lang="de-DE" smtClean="0"/>
-              <a:t>07.05.2024</a:t>
+              <a:t>10.05.2024</a:t>
             </a:fld>
             <a:endParaRPr lang="de-DE"/>
           </a:p>
@@ -1141,7 +1145,7 @@
           <a:p>
             <a:fld id="{7C169F67-FBE8-437D-8D9C-565492D9862F}" type="datetimeFigureOut">
               <a:rPr lang="de-DE" smtClean="0"/>
-              <a:t>07.05.2024</a:t>
+              <a:t>10.05.2024</a:t>
             </a:fld>
             <a:endParaRPr lang="de-DE"/>
           </a:p>
@@ -1406,7 +1410,7 @@
           <a:p>
             <a:fld id="{7C169F67-FBE8-437D-8D9C-565492D9862F}" type="datetimeFigureOut">
               <a:rPr lang="de-DE" smtClean="0"/>
-              <a:t>07.05.2024</a:t>
+              <a:t>10.05.2024</a:t>
             </a:fld>
             <a:endParaRPr lang="de-DE"/>
           </a:p>
@@ -1818,7 +1822,7 @@
           <a:p>
             <a:fld id="{7C169F67-FBE8-437D-8D9C-565492D9862F}" type="datetimeFigureOut">
               <a:rPr lang="de-DE" smtClean="0"/>
-              <a:t>07.05.2024</a:t>
+              <a:t>10.05.2024</a:t>
             </a:fld>
             <a:endParaRPr lang="de-DE"/>
           </a:p>
@@ -1959,7 +1963,7 @@
           <a:p>
             <a:fld id="{7C169F67-FBE8-437D-8D9C-565492D9862F}" type="datetimeFigureOut">
               <a:rPr lang="de-DE" smtClean="0"/>
-              <a:t>07.05.2024</a:t>
+              <a:t>10.05.2024</a:t>
             </a:fld>
             <a:endParaRPr lang="de-DE"/>
           </a:p>
@@ -2072,7 +2076,7 @@
           <a:p>
             <a:fld id="{7C169F67-FBE8-437D-8D9C-565492D9862F}" type="datetimeFigureOut">
               <a:rPr lang="de-DE" smtClean="0"/>
-              <a:t>07.05.2024</a:t>
+              <a:t>10.05.2024</a:t>
             </a:fld>
             <a:endParaRPr lang="de-DE"/>
           </a:p>
@@ -2383,7 +2387,7 @@
           <a:p>
             <a:fld id="{7C169F67-FBE8-437D-8D9C-565492D9862F}" type="datetimeFigureOut">
               <a:rPr lang="de-DE" smtClean="0"/>
-              <a:t>07.05.2024</a:t>
+              <a:t>10.05.2024</a:t>
             </a:fld>
             <a:endParaRPr lang="de-DE"/>
           </a:p>
@@ -2671,7 +2675,7 @@
           <a:p>
             <a:fld id="{7C169F67-FBE8-437D-8D9C-565492D9862F}" type="datetimeFigureOut">
               <a:rPr lang="de-DE" smtClean="0"/>
-              <a:t>07.05.2024</a:t>
+              <a:t>10.05.2024</a:t>
             </a:fld>
             <a:endParaRPr lang="de-DE"/>
           </a:p>
@@ -2912,7 +2916,7 @@
           <a:p>
             <a:fld id="{7C169F67-FBE8-437D-8D9C-565492D9862F}" type="datetimeFigureOut">
               <a:rPr lang="de-DE" smtClean="0"/>
-              <a:t>07.05.2024</a:t>
+              <a:t>10.05.2024</a:t>
             </a:fld>
             <a:endParaRPr lang="de-DE"/>
           </a:p>
@@ -5627,6 +5631,2567 @@
 <file path=ppt/slides/slide3.xml><?xml version="1.0" encoding="utf-8"?>
 <p:sld xmlns:a="http://schemas.openxmlformats.org/drawingml/2006/main" xmlns:r="http://schemas.openxmlformats.org/officeDocument/2006/relationships" xmlns:p="http://schemas.openxmlformats.org/presentationml/2006/main">
   <p:cSld>
+    <p:bg>
+      <p:bgPr>
+        <a:solidFill>
+          <a:schemeClr val="accent2"/>
+        </a:solidFill>
+        <a:effectLst/>
+      </p:bgPr>
+    </p:bg>
+    <p:spTree>
+      <p:nvGrpSpPr>
+        <p:cNvPr id="1" name=""/>
+        <p:cNvGrpSpPr/>
+        <p:nvPr/>
+      </p:nvGrpSpPr>
+      <p:grpSpPr>
+        <a:xfrm>
+          <a:off x="0" y="0"/>
+          <a:ext cx="0" cy="0"/>
+          <a:chOff x="0" y="0"/>
+          <a:chExt cx="0" cy="0"/>
+        </a:xfrm>
+      </p:grpSpPr>
+      <p:sp>
+        <p:nvSpPr>
+          <p:cNvPr id="15" name="Rechteck: abgerundete Ecken 14">
+            <a:extLst>
+              <a:ext uri="{FF2B5EF4-FFF2-40B4-BE49-F238E27FC236}">
+                <a16:creationId xmlns:a16="http://schemas.microsoft.com/office/drawing/2014/main" id="{7EABC2F2-560C-0376-8481-BCF57ED6DAA1}"/>
+              </a:ext>
+            </a:extLst>
+          </p:cNvPr>
+          <p:cNvSpPr/>
+          <p:nvPr/>
+        </p:nvSpPr>
+        <p:spPr>
+          <a:xfrm>
+            <a:off x="2204625" y="189000"/>
+            <a:ext cx="6480000" cy="6480000"/>
+          </a:xfrm>
+          <a:prstGeom prst="roundRect">
+            <a:avLst/>
+          </a:prstGeom>
+          <a:solidFill>
+            <a:schemeClr val="tx1"/>
+          </a:solidFill>
+        </p:spPr>
+        <p:style>
+          <a:lnRef idx="2">
+            <a:schemeClr val="accent1">
+              <a:shade val="15000"/>
+            </a:schemeClr>
+          </a:lnRef>
+          <a:fillRef idx="1">
+            <a:schemeClr val="accent1"/>
+          </a:fillRef>
+          <a:effectRef idx="0">
+            <a:schemeClr val="accent1"/>
+          </a:effectRef>
+          <a:fontRef idx="minor">
+            <a:schemeClr val="lt1"/>
+          </a:fontRef>
+        </p:style>
+        <p:txBody>
+          <a:bodyPr rtlCol="0" anchor="ctr"/>
+          <a:lstStyle/>
+          <a:p>
+            <a:pPr algn="ctr"/>
+            <a:endParaRPr lang="de-DE"/>
+          </a:p>
+        </p:txBody>
+      </p:sp>
+      <p:grpSp>
+        <p:nvGrpSpPr>
+          <p:cNvPr id="6" name="Grafik 4">
+            <a:extLst>
+              <a:ext uri="{FF2B5EF4-FFF2-40B4-BE49-F238E27FC236}">
+                <a16:creationId xmlns:a16="http://schemas.microsoft.com/office/drawing/2014/main" id="{FE4752A5-87F6-DC8B-13AC-1EF48FDAF556}"/>
+              </a:ext>
+            </a:extLst>
+          </p:cNvPr>
+          <p:cNvGrpSpPr/>
+          <p:nvPr/>
+        </p:nvGrpSpPr>
+        <p:grpSpPr>
+          <a:xfrm>
+            <a:off x="6492287" y="780842"/>
+            <a:ext cx="1394772" cy="2295144"/>
+            <a:chOff x="4032288" y="49226"/>
+            <a:chExt cx="4129542" cy="6760862"/>
+          </a:xfrm>
+        </p:grpSpPr>
+        <p:sp>
+          <p:nvSpPr>
+            <p:cNvPr id="7" name="Freihandform: Form 6">
+              <a:extLst>
+                <a:ext uri="{FF2B5EF4-FFF2-40B4-BE49-F238E27FC236}">
+                  <a16:creationId xmlns:a16="http://schemas.microsoft.com/office/drawing/2014/main" id="{E96B609A-A200-BFE8-6146-3BFD94EE6120}"/>
+                </a:ext>
+              </a:extLst>
+            </p:cNvPr>
+            <p:cNvSpPr/>
+            <p:nvPr/>
+          </p:nvSpPr>
+          <p:spPr>
+            <a:xfrm flipV="1">
+              <a:off x="4032288" y="49226"/>
+              <a:ext cx="4129542" cy="6760862"/>
+            </a:xfrm>
+            <a:custGeom>
+              <a:avLst/>
+              <a:gdLst>
+                <a:gd name="connsiteX0" fmla="*/ 2062825 w 4129542"/>
+                <a:gd name="connsiteY0" fmla="*/ -3486 h 6760862"/>
+                <a:gd name="connsiteX1" fmla="*/ 264879 w 4129542"/>
+                <a:gd name="connsiteY1" fmla="*/ 2692249 h 6760862"/>
+                <a:gd name="connsiteX2" fmla="*/ 264879 w 4129542"/>
+                <a:gd name="connsiteY2" fmla="*/ 4611001 h 6760862"/>
+                <a:gd name="connsiteX3" fmla="*/ 1110420 w 4129542"/>
+                <a:gd name="connsiteY3" fmla="*/ 6757373 h 6760862"/>
+                <a:gd name="connsiteX4" fmla="*/ 1785225 w 4129542"/>
+                <a:gd name="connsiteY4" fmla="*/ 5302066 h 6760862"/>
+                <a:gd name="connsiteX5" fmla="*/ 2340426 w 4129542"/>
+                <a:gd name="connsiteY5" fmla="*/ 5302066 h 6760862"/>
+                <a:gd name="connsiteX6" fmla="*/ 3015231 w 4129542"/>
+                <a:gd name="connsiteY6" fmla="*/ 6757373 h 6760862"/>
+                <a:gd name="connsiteX7" fmla="*/ 3860772 w 4129542"/>
+                <a:gd name="connsiteY7" fmla="*/ 4611001 h 6760862"/>
+                <a:gd name="connsiteX8" fmla="*/ 3860772 w 4129542"/>
+                <a:gd name="connsiteY8" fmla="*/ 2692249 h 6760862"/>
+                <a:gd name="connsiteX9" fmla="*/ 2062825 w 4129542"/>
+                <a:gd name="connsiteY9" fmla="*/ -3486 h 6760862"/>
+              </a:gdLst>
+              <a:ahLst/>
+              <a:cxnLst>
+                <a:cxn ang="0">
+                  <a:pos x="connsiteX0" y="connsiteY0"/>
+                </a:cxn>
+                <a:cxn ang="0">
+                  <a:pos x="connsiteX1" y="connsiteY1"/>
+                </a:cxn>
+                <a:cxn ang="0">
+                  <a:pos x="connsiteX2" y="connsiteY2"/>
+                </a:cxn>
+                <a:cxn ang="0">
+                  <a:pos x="connsiteX3" y="connsiteY3"/>
+                </a:cxn>
+                <a:cxn ang="0">
+                  <a:pos x="connsiteX4" y="connsiteY4"/>
+                </a:cxn>
+                <a:cxn ang="0">
+                  <a:pos x="connsiteX5" y="connsiteY5"/>
+                </a:cxn>
+                <a:cxn ang="0">
+                  <a:pos x="connsiteX6" y="connsiteY6"/>
+                </a:cxn>
+                <a:cxn ang="0">
+                  <a:pos x="connsiteX7" y="connsiteY7"/>
+                </a:cxn>
+                <a:cxn ang="0">
+                  <a:pos x="connsiteX8" y="connsiteY8"/>
+                </a:cxn>
+                <a:cxn ang="0">
+                  <a:pos x="connsiteX9" y="connsiteY9"/>
+                </a:cxn>
+              </a:cxnLst>
+              <a:rect l="l" t="t" r="r" b="b"/>
+              <a:pathLst>
+                <a:path w="4129542" h="6760862">
+                  <a:moveTo>
+                    <a:pt x="2062825" y="-3486"/>
+                  </a:moveTo>
+                  <a:cubicBezTo>
+                    <a:pt x="2060959" y="-6279"/>
+                    <a:pt x="433066" y="2440078"/>
+                    <a:pt x="264879" y="2692249"/>
+                  </a:cubicBezTo>
+                  <a:cubicBezTo>
+                    <a:pt x="-191994" y="3377255"/>
+                    <a:pt x="26635" y="4006221"/>
+                    <a:pt x="264879" y="4611001"/>
+                  </a:cubicBezTo>
+                  <a:lnTo>
+                    <a:pt x="1110420" y="6757373"/>
+                  </a:lnTo>
+                  <a:lnTo>
+                    <a:pt x="1785225" y="5302066"/>
+                  </a:lnTo>
+                  <a:cubicBezTo>
+                    <a:pt x="1928631" y="5351553"/>
+                    <a:pt x="2197019" y="5351212"/>
+                    <a:pt x="2340426" y="5302066"/>
+                  </a:cubicBezTo>
+                  <a:lnTo>
+                    <a:pt x="3015231" y="6757373"/>
+                  </a:lnTo>
+                  <a:lnTo>
+                    <a:pt x="3860772" y="4611001"/>
+                  </a:lnTo>
+                  <a:cubicBezTo>
+                    <a:pt x="4099009" y="4006221"/>
+                    <a:pt x="4317638" y="3377255"/>
+                    <a:pt x="3860772" y="2692249"/>
+                  </a:cubicBezTo>
+                  <a:lnTo>
+                    <a:pt x="2062825" y="-3486"/>
+                  </a:lnTo>
+                </a:path>
+              </a:pathLst>
+            </a:custGeom>
+            <a:solidFill>
+              <a:srgbClr val="FFFFFF"/>
+            </a:solidFill>
+            <a:ln w="852" cap="flat">
+              <a:noFill/>
+              <a:prstDash val="solid"/>
+              <a:miter/>
+            </a:ln>
+          </p:spPr>
+          <p:txBody>
+            <a:bodyPr rtlCol="0" anchor="ctr"/>
+            <a:lstStyle/>
+            <a:p>
+              <a:endParaRPr lang="de-DE"/>
+            </a:p>
+          </p:txBody>
+        </p:sp>
+        <p:sp>
+          <p:nvSpPr>
+            <p:cNvPr id="8" name="Freihandform: Form 7">
+              <a:extLst>
+                <a:ext uri="{FF2B5EF4-FFF2-40B4-BE49-F238E27FC236}">
+                  <a16:creationId xmlns:a16="http://schemas.microsoft.com/office/drawing/2014/main" id="{CBEC3B89-DCE1-AF29-ACAD-DB921847FDC3}"/>
+                </a:ext>
+              </a:extLst>
+            </p:cNvPr>
+            <p:cNvSpPr/>
+            <p:nvPr/>
+          </p:nvSpPr>
+          <p:spPr>
+            <a:xfrm flipV="1">
+              <a:off x="4032288" y="49226"/>
+              <a:ext cx="4129542" cy="6760862"/>
+            </a:xfrm>
+            <a:custGeom>
+              <a:avLst/>
+              <a:gdLst>
+                <a:gd name="connsiteX0" fmla="*/ 2062825 w 4129542"/>
+                <a:gd name="connsiteY0" fmla="*/ -3486 h 6760862"/>
+                <a:gd name="connsiteX1" fmla="*/ 264879 w 4129542"/>
+                <a:gd name="connsiteY1" fmla="*/ 2692249 h 6760862"/>
+                <a:gd name="connsiteX2" fmla="*/ 264879 w 4129542"/>
+                <a:gd name="connsiteY2" fmla="*/ 4611001 h 6760862"/>
+                <a:gd name="connsiteX3" fmla="*/ 1110420 w 4129542"/>
+                <a:gd name="connsiteY3" fmla="*/ 6757373 h 6760862"/>
+                <a:gd name="connsiteX4" fmla="*/ 1785225 w 4129542"/>
+                <a:gd name="connsiteY4" fmla="*/ 5302066 h 6760862"/>
+                <a:gd name="connsiteX5" fmla="*/ 2340426 w 4129542"/>
+                <a:gd name="connsiteY5" fmla="*/ 5302066 h 6760862"/>
+                <a:gd name="connsiteX6" fmla="*/ 3015231 w 4129542"/>
+                <a:gd name="connsiteY6" fmla="*/ 6757373 h 6760862"/>
+                <a:gd name="connsiteX7" fmla="*/ 3860772 w 4129542"/>
+                <a:gd name="connsiteY7" fmla="*/ 4611001 h 6760862"/>
+                <a:gd name="connsiteX8" fmla="*/ 3860772 w 4129542"/>
+                <a:gd name="connsiteY8" fmla="*/ 2692249 h 6760862"/>
+              </a:gdLst>
+              <a:ahLst/>
+              <a:cxnLst>
+                <a:cxn ang="0">
+                  <a:pos x="connsiteX0" y="connsiteY0"/>
+                </a:cxn>
+                <a:cxn ang="0">
+                  <a:pos x="connsiteX1" y="connsiteY1"/>
+                </a:cxn>
+                <a:cxn ang="0">
+                  <a:pos x="connsiteX2" y="connsiteY2"/>
+                </a:cxn>
+                <a:cxn ang="0">
+                  <a:pos x="connsiteX3" y="connsiteY3"/>
+                </a:cxn>
+                <a:cxn ang="0">
+                  <a:pos x="connsiteX4" y="connsiteY4"/>
+                </a:cxn>
+                <a:cxn ang="0">
+                  <a:pos x="connsiteX5" y="connsiteY5"/>
+                </a:cxn>
+                <a:cxn ang="0">
+                  <a:pos x="connsiteX6" y="connsiteY6"/>
+                </a:cxn>
+                <a:cxn ang="0">
+                  <a:pos x="connsiteX7" y="connsiteY7"/>
+                </a:cxn>
+                <a:cxn ang="0">
+                  <a:pos x="connsiteX8" y="connsiteY8"/>
+                </a:cxn>
+              </a:cxnLst>
+              <a:rect l="l" t="t" r="r" b="b"/>
+              <a:pathLst>
+                <a:path w="4129542" h="6760862">
+                  <a:moveTo>
+                    <a:pt x="2062825" y="-3486"/>
+                  </a:moveTo>
+                  <a:cubicBezTo>
+                    <a:pt x="2060959" y="-6279"/>
+                    <a:pt x="433066" y="2440078"/>
+                    <a:pt x="264879" y="2692249"/>
+                  </a:cubicBezTo>
+                  <a:cubicBezTo>
+                    <a:pt x="-191994" y="3377255"/>
+                    <a:pt x="26635" y="4006221"/>
+                    <a:pt x="264879" y="4611001"/>
+                  </a:cubicBezTo>
+                  <a:lnTo>
+                    <a:pt x="1110420" y="6757373"/>
+                  </a:lnTo>
+                  <a:lnTo>
+                    <a:pt x="1785225" y="5302066"/>
+                  </a:lnTo>
+                  <a:cubicBezTo>
+                    <a:pt x="1928631" y="5351553"/>
+                    <a:pt x="2197019" y="5351212"/>
+                    <a:pt x="2340426" y="5302066"/>
+                  </a:cubicBezTo>
+                  <a:lnTo>
+                    <a:pt x="3015231" y="6757373"/>
+                  </a:lnTo>
+                  <a:lnTo>
+                    <a:pt x="3860772" y="4611001"/>
+                  </a:lnTo>
+                  <a:cubicBezTo>
+                    <a:pt x="4099009" y="4006221"/>
+                    <a:pt x="4317638" y="3377255"/>
+                    <a:pt x="3860772" y="2692249"/>
+                  </a:cubicBezTo>
+                  <a:close/>
+                </a:path>
+              </a:pathLst>
+            </a:custGeom>
+            <a:noFill/>
+            <a:ln w="1841" cap="flat">
+              <a:solidFill>
+                <a:srgbClr val="231F20"/>
+              </a:solidFill>
+              <a:prstDash val="solid"/>
+              <a:miter/>
+            </a:ln>
+          </p:spPr>
+          <p:txBody>
+            <a:bodyPr rtlCol="0" anchor="ctr"/>
+            <a:lstStyle/>
+            <a:p>
+              <a:endParaRPr lang="de-DE"/>
+            </a:p>
+          </p:txBody>
+        </p:sp>
+        <p:sp>
+          <p:nvSpPr>
+            <p:cNvPr id="9" name="Freihandform: Form 8">
+              <a:extLst>
+                <a:ext uri="{FF2B5EF4-FFF2-40B4-BE49-F238E27FC236}">
+                  <a16:creationId xmlns:a16="http://schemas.microsoft.com/office/drawing/2014/main" id="{42340D18-EBB4-6BB7-0ACB-E73601C02058}"/>
+                </a:ext>
+              </a:extLst>
+            </p:cNvPr>
+            <p:cNvSpPr/>
+            <p:nvPr/>
+          </p:nvSpPr>
+          <p:spPr>
+            <a:xfrm flipV="1">
+              <a:off x="4340540" y="2731118"/>
+              <a:ext cx="1462221" cy="1573903"/>
+            </a:xfrm>
+            <a:custGeom>
+              <a:avLst/>
+              <a:gdLst>
+                <a:gd name="connsiteX0" fmla="*/ 1086785 w 1462221"/>
+                <a:gd name="connsiteY0" fmla="*/ 1099431 h 1573903"/>
+                <a:gd name="connsiteX1" fmla="*/ 1368816 w 1462221"/>
+                <a:gd name="connsiteY1" fmla="*/ 62617 h 1573903"/>
+                <a:gd name="connsiteX2" fmla="*/ 373620 w 1462221"/>
+                <a:gd name="connsiteY2" fmla="*/ 467730 h 1573903"/>
+                <a:gd name="connsiteX3" fmla="*/ 91599 w 1462221"/>
+                <a:gd name="connsiteY3" fmla="*/ 1504544 h 1573903"/>
+                <a:gd name="connsiteX4" fmla="*/ 1086785 w 1462221"/>
+                <a:gd name="connsiteY4" fmla="*/ 1099431 h 1573903"/>
+              </a:gdLst>
+              <a:ahLst/>
+              <a:cxnLst>
+                <a:cxn ang="0">
+                  <a:pos x="connsiteX0" y="connsiteY0"/>
+                </a:cxn>
+                <a:cxn ang="0">
+                  <a:pos x="connsiteX1" y="connsiteY1"/>
+                </a:cxn>
+                <a:cxn ang="0">
+                  <a:pos x="connsiteX2" y="connsiteY2"/>
+                </a:cxn>
+                <a:cxn ang="0">
+                  <a:pos x="connsiteX3" y="connsiteY3"/>
+                </a:cxn>
+                <a:cxn ang="0">
+                  <a:pos x="connsiteX4" y="connsiteY4"/>
+                </a:cxn>
+              </a:cxnLst>
+              <a:rect l="l" t="t" r="r" b="b"/>
+              <a:pathLst>
+                <a:path w="1462221" h="1573903">
+                  <a:moveTo>
+                    <a:pt x="1086785" y="1099431"/>
+                  </a:moveTo>
+                  <a:cubicBezTo>
+                    <a:pt x="1438517" y="702337"/>
+                    <a:pt x="1565211" y="236582"/>
+                    <a:pt x="1368816" y="62617"/>
+                  </a:cubicBezTo>
+                  <a:cubicBezTo>
+                    <a:pt x="1172412" y="-111349"/>
+                    <a:pt x="725355" y="70636"/>
+                    <a:pt x="373620" y="467730"/>
+                  </a:cubicBezTo>
+                  <a:cubicBezTo>
+                    <a:pt x="21890" y="864824"/>
+                    <a:pt x="-104804" y="1330579"/>
+                    <a:pt x="91599" y="1504544"/>
+                  </a:cubicBezTo>
+                  <a:cubicBezTo>
+                    <a:pt x="288001" y="1678510"/>
+                    <a:pt x="735052" y="1496525"/>
+                    <a:pt x="1086785" y="1099431"/>
+                  </a:cubicBezTo>
+                </a:path>
+              </a:pathLst>
+            </a:custGeom>
+            <a:solidFill>
+              <a:srgbClr val="000000"/>
+            </a:solidFill>
+            <a:ln w="852" cap="flat">
+              <a:noFill/>
+              <a:prstDash val="solid"/>
+              <a:miter/>
+            </a:ln>
+          </p:spPr>
+          <p:txBody>
+            <a:bodyPr rtlCol="0" anchor="ctr"/>
+            <a:lstStyle/>
+            <a:p>
+              <a:endParaRPr lang="de-DE"/>
+            </a:p>
+          </p:txBody>
+        </p:sp>
+        <p:sp>
+          <p:nvSpPr>
+            <p:cNvPr id="10" name="Freihandform: Form 9">
+              <a:extLst>
+                <a:ext uri="{FF2B5EF4-FFF2-40B4-BE49-F238E27FC236}">
+                  <a16:creationId xmlns:a16="http://schemas.microsoft.com/office/drawing/2014/main" id="{77AA5D95-034B-3CC6-ACB9-5C3B248B60C3}"/>
+                </a:ext>
+              </a:extLst>
+            </p:cNvPr>
+            <p:cNvSpPr/>
+            <p:nvPr/>
+          </p:nvSpPr>
+          <p:spPr>
+            <a:xfrm flipV="1">
+              <a:off x="4340540" y="2731118"/>
+              <a:ext cx="1462221" cy="1573903"/>
+            </a:xfrm>
+            <a:custGeom>
+              <a:avLst/>
+              <a:gdLst>
+                <a:gd name="connsiteX0" fmla="*/ 1086785 w 1462221"/>
+                <a:gd name="connsiteY0" fmla="*/ 1099431 h 1573903"/>
+                <a:gd name="connsiteX1" fmla="*/ 1368816 w 1462221"/>
+                <a:gd name="connsiteY1" fmla="*/ 62617 h 1573903"/>
+                <a:gd name="connsiteX2" fmla="*/ 373620 w 1462221"/>
+                <a:gd name="connsiteY2" fmla="*/ 467730 h 1573903"/>
+                <a:gd name="connsiteX3" fmla="*/ 91599 w 1462221"/>
+                <a:gd name="connsiteY3" fmla="*/ 1504544 h 1573903"/>
+                <a:gd name="connsiteX4" fmla="*/ 1086785 w 1462221"/>
+                <a:gd name="connsiteY4" fmla="*/ 1099431 h 1573903"/>
+              </a:gdLst>
+              <a:ahLst/>
+              <a:cxnLst>
+                <a:cxn ang="0">
+                  <a:pos x="connsiteX0" y="connsiteY0"/>
+                </a:cxn>
+                <a:cxn ang="0">
+                  <a:pos x="connsiteX1" y="connsiteY1"/>
+                </a:cxn>
+                <a:cxn ang="0">
+                  <a:pos x="connsiteX2" y="connsiteY2"/>
+                </a:cxn>
+                <a:cxn ang="0">
+                  <a:pos x="connsiteX3" y="connsiteY3"/>
+                </a:cxn>
+                <a:cxn ang="0">
+                  <a:pos x="connsiteX4" y="connsiteY4"/>
+                </a:cxn>
+              </a:cxnLst>
+              <a:rect l="l" t="t" r="r" b="b"/>
+              <a:pathLst>
+                <a:path w="1462221" h="1573903">
+                  <a:moveTo>
+                    <a:pt x="1086785" y="1099431"/>
+                  </a:moveTo>
+                  <a:cubicBezTo>
+                    <a:pt x="1438517" y="702337"/>
+                    <a:pt x="1565211" y="236582"/>
+                    <a:pt x="1368816" y="62617"/>
+                  </a:cubicBezTo>
+                  <a:cubicBezTo>
+                    <a:pt x="1172412" y="-111349"/>
+                    <a:pt x="725355" y="70636"/>
+                    <a:pt x="373620" y="467730"/>
+                  </a:cubicBezTo>
+                  <a:cubicBezTo>
+                    <a:pt x="21890" y="864824"/>
+                    <a:pt x="-104804" y="1330579"/>
+                    <a:pt x="91599" y="1504544"/>
+                  </a:cubicBezTo>
+                  <a:cubicBezTo>
+                    <a:pt x="288001" y="1678510"/>
+                    <a:pt x="735052" y="1496525"/>
+                    <a:pt x="1086785" y="1099431"/>
+                  </a:cubicBezTo>
+                  <a:close/>
+                </a:path>
+              </a:pathLst>
+            </a:custGeom>
+            <a:noFill/>
+            <a:ln w="1841" cap="flat">
+              <a:solidFill>
+                <a:srgbClr val="231F20"/>
+              </a:solidFill>
+              <a:prstDash val="solid"/>
+              <a:miter/>
+            </a:ln>
+          </p:spPr>
+          <p:txBody>
+            <a:bodyPr rtlCol="0" anchor="ctr"/>
+            <a:lstStyle/>
+            <a:p>
+              <a:endParaRPr lang="de-DE"/>
+            </a:p>
+          </p:txBody>
+        </p:sp>
+        <p:sp>
+          <p:nvSpPr>
+            <p:cNvPr id="11" name="Freihandform: Form 10">
+              <a:extLst>
+                <a:ext uri="{FF2B5EF4-FFF2-40B4-BE49-F238E27FC236}">
+                  <a16:creationId xmlns:a16="http://schemas.microsoft.com/office/drawing/2014/main" id="{D926C69E-A33B-9BC9-A4A0-384BF3FC5035}"/>
+                </a:ext>
+              </a:extLst>
+            </p:cNvPr>
+            <p:cNvSpPr/>
+            <p:nvPr/>
+          </p:nvSpPr>
+          <p:spPr>
+            <a:xfrm flipV="1">
+              <a:off x="5531070" y="4642847"/>
+              <a:ext cx="1131446" cy="973461"/>
+            </a:xfrm>
+            <a:custGeom>
+              <a:avLst/>
+              <a:gdLst>
+                <a:gd name="connsiteX0" fmla="*/ 678569 w 1131446"/>
+                <a:gd name="connsiteY0" fmla="*/ 906739 h 973461"/>
+                <a:gd name="connsiteX1" fmla="*/ 1114557 w 1131446"/>
+                <a:gd name="connsiteY1" fmla="*/ 150200 h 973461"/>
+                <a:gd name="connsiteX2" fmla="*/ 938222 w 1131446"/>
+                <a:gd name="connsiteY2" fmla="*/ 47486 h 973461"/>
+                <a:gd name="connsiteX3" fmla="*/ 564043 w 1131446"/>
+                <a:gd name="connsiteY3" fmla="*/ 696478 h 973461"/>
+                <a:gd name="connsiteX4" fmla="*/ 189362 w 1131446"/>
+                <a:gd name="connsiteY4" fmla="*/ 46736 h 973461"/>
+                <a:gd name="connsiteX5" fmla="*/ 11953 w 1131446"/>
+                <a:gd name="connsiteY5" fmla="*/ 150354 h 973461"/>
+                <a:gd name="connsiteX6" fmla="*/ 450140 w 1131446"/>
+                <a:gd name="connsiteY6" fmla="*/ 907676 h 973461"/>
+                <a:gd name="connsiteX7" fmla="*/ 678569 w 1131446"/>
+                <a:gd name="connsiteY7" fmla="*/ 906739 h 973461"/>
+              </a:gdLst>
+              <a:ahLst/>
+              <a:cxnLst>
+                <a:cxn ang="0">
+                  <a:pos x="connsiteX0" y="connsiteY0"/>
+                </a:cxn>
+                <a:cxn ang="0">
+                  <a:pos x="connsiteX1" y="connsiteY1"/>
+                </a:cxn>
+                <a:cxn ang="0">
+                  <a:pos x="connsiteX2" y="connsiteY2"/>
+                </a:cxn>
+                <a:cxn ang="0">
+                  <a:pos x="connsiteX3" y="connsiteY3"/>
+                </a:cxn>
+                <a:cxn ang="0">
+                  <a:pos x="connsiteX4" y="connsiteY4"/>
+                </a:cxn>
+                <a:cxn ang="0">
+                  <a:pos x="connsiteX5" y="connsiteY5"/>
+                </a:cxn>
+                <a:cxn ang="0">
+                  <a:pos x="connsiteX6" y="connsiteY6"/>
+                </a:cxn>
+                <a:cxn ang="0">
+                  <a:pos x="connsiteX7" y="connsiteY7"/>
+                </a:cxn>
+              </a:cxnLst>
+              <a:rect l="l" t="t" r="r" b="b"/>
+              <a:pathLst>
+                <a:path w="1131446" h="973461">
+                  <a:moveTo>
+                    <a:pt x="678569" y="906739"/>
+                  </a:moveTo>
+                  <a:lnTo>
+                    <a:pt x="1114557" y="150200"/>
+                  </a:lnTo>
+                  <a:cubicBezTo>
+                    <a:pt x="1182212" y="32820"/>
+                    <a:pt x="1001829" y="-62855"/>
+                    <a:pt x="938222" y="47486"/>
+                  </a:cubicBezTo>
+                  <a:lnTo>
+                    <a:pt x="564043" y="696478"/>
+                  </a:lnTo>
+                  <a:lnTo>
+                    <a:pt x="189362" y="46736"/>
+                  </a:lnTo>
+                  <a:cubicBezTo>
+                    <a:pt x="124979" y="-64917"/>
+                    <a:pt x="-52592" y="38794"/>
+                    <a:pt x="11953" y="150354"/>
+                  </a:cubicBezTo>
+                  <a:lnTo>
+                    <a:pt x="450140" y="907676"/>
+                  </a:lnTo>
+                  <a:cubicBezTo>
+                    <a:pt x="500487" y="994676"/>
+                    <a:pt x="628775" y="993134"/>
+                    <a:pt x="678569" y="906739"/>
+                  </a:cubicBezTo>
+                </a:path>
+              </a:pathLst>
+            </a:custGeom>
+            <a:solidFill>
+              <a:srgbClr val="000000"/>
+            </a:solidFill>
+            <a:ln w="852" cap="flat">
+              <a:noFill/>
+              <a:prstDash val="solid"/>
+              <a:miter/>
+            </a:ln>
+          </p:spPr>
+          <p:txBody>
+            <a:bodyPr rtlCol="0" anchor="ctr"/>
+            <a:lstStyle/>
+            <a:p>
+              <a:endParaRPr lang="de-DE"/>
+            </a:p>
+          </p:txBody>
+        </p:sp>
+        <p:sp>
+          <p:nvSpPr>
+            <p:cNvPr id="12" name="Freihandform: Form 11">
+              <a:extLst>
+                <a:ext uri="{FF2B5EF4-FFF2-40B4-BE49-F238E27FC236}">
+                  <a16:creationId xmlns:a16="http://schemas.microsoft.com/office/drawing/2014/main" id="{28B6948F-902E-A84C-A4AD-5CC9C14F7B76}"/>
+                </a:ext>
+              </a:extLst>
+            </p:cNvPr>
+            <p:cNvSpPr/>
+            <p:nvPr/>
+          </p:nvSpPr>
+          <p:spPr>
+            <a:xfrm flipV="1">
+              <a:off x="5531070" y="4642847"/>
+              <a:ext cx="1131446" cy="973461"/>
+            </a:xfrm>
+            <a:custGeom>
+              <a:avLst/>
+              <a:gdLst>
+                <a:gd name="connsiteX0" fmla="*/ 678569 w 1131446"/>
+                <a:gd name="connsiteY0" fmla="*/ 906739 h 973461"/>
+                <a:gd name="connsiteX1" fmla="*/ 1114557 w 1131446"/>
+                <a:gd name="connsiteY1" fmla="*/ 150200 h 973461"/>
+                <a:gd name="connsiteX2" fmla="*/ 938222 w 1131446"/>
+                <a:gd name="connsiteY2" fmla="*/ 47486 h 973461"/>
+                <a:gd name="connsiteX3" fmla="*/ 564043 w 1131446"/>
+                <a:gd name="connsiteY3" fmla="*/ 696478 h 973461"/>
+                <a:gd name="connsiteX4" fmla="*/ 189362 w 1131446"/>
+                <a:gd name="connsiteY4" fmla="*/ 46736 h 973461"/>
+                <a:gd name="connsiteX5" fmla="*/ 11953 w 1131446"/>
+                <a:gd name="connsiteY5" fmla="*/ 150354 h 973461"/>
+                <a:gd name="connsiteX6" fmla="*/ 450140 w 1131446"/>
+                <a:gd name="connsiteY6" fmla="*/ 907676 h 973461"/>
+                <a:gd name="connsiteX7" fmla="*/ 678569 w 1131446"/>
+                <a:gd name="connsiteY7" fmla="*/ 906739 h 973461"/>
+              </a:gdLst>
+              <a:ahLst/>
+              <a:cxnLst>
+                <a:cxn ang="0">
+                  <a:pos x="connsiteX0" y="connsiteY0"/>
+                </a:cxn>
+                <a:cxn ang="0">
+                  <a:pos x="connsiteX1" y="connsiteY1"/>
+                </a:cxn>
+                <a:cxn ang="0">
+                  <a:pos x="connsiteX2" y="connsiteY2"/>
+                </a:cxn>
+                <a:cxn ang="0">
+                  <a:pos x="connsiteX3" y="connsiteY3"/>
+                </a:cxn>
+                <a:cxn ang="0">
+                  <a:pos x="connsiteX4" y="connsiteY4"/>
+                </a:cxn>
+                <a:cxn ang="0">
+                  <a:pos x="connsiteX5" y="connsiteY5"/>
+                </a:cxn>
+                <a:cxn ang="0">
+                  <a:pos x="connsiteX6" y="connsiteY6"/>
+                </a:cxn>
+                <a:cxn ang="0">
+                  <a:pos x="connsiteX7" y="connsiteY7"/>
+                </a:cxn>
+              </a:cxnLst>
+              <a:rect l="l" t="t" r="r" b="b"/>
+              <a:pathLst>
+                <a:path w="1131446" h="973461">
+                  <a:moveTo>
+                    <a:pt x="678569" y="906739"/>
+                  </a:moveTo>
+                  <a:lnTo>
+                    <a:pt x="1114557" y="150200"/>
+                  </a:lnTo>
+                  <a:cubicBezTo>
+                    <a:pt x="1182212" y="32820"/>
+                    <a:pt x="1001829" y="-62855"/>
+                    <a:pt x="938222" y="47486"/>
+                  </a:cubicBezTo>
+                  <a:lnTo>
+                    <a:pt x="564043" y="696478"/>
+                  </a:lnTo>
+                  <a:lnTo>
+                    <a:pt x="189362" y="46736"/>
+                  </a:lnTo>
+                  <a:cubicBezTo>
+                    <a:pt x="124979" y="-64917"/>
+                    <a:pt x="-52592" y="38794"/>
+                    <a:pt x="11953" y="150354"/>
+                  </a:cubicBezTo>
+                  <a:lnTo>
+                    <a:pt x="450140" y="907676"/>
+                  </a:lnTo>
+                  <a:cubicBezTo>
+                    <a:pt x="500487" y="994676"/>
+                    <a:pt x="628775" y="993134"/>
+                    <a:pt x="678569" y="906739"/>
+                  </a:cubicBezTo>
+                  <a:close/>
+                </a:path>
+              </a:pathLst>
+            </a:custGeom>
+            <a:noFill/>
+            <a:ln w="1841" cap="flat">
+              <a:solidFill>
+                <a:srgbClr val="231F20"/>
+              </a:solidFill>
+              <a:prstDash val="solid"/>
+              <a:miter/>
+            </a:ln>
+          </p:spPr>
+          <p:txBody>
+            <a:bodyPr rtlCol="0" anchor="ctr"/>
+            <a:lstStyle/>
+            <a:p>
+              <a:endParaRPr lang="de-DE"/>
+            </a:p>
+          </p:txBody>
+        </p:sp>
+        <p:sp>
+          <p:nvSpPr>
+            <p:cNvPr id="13" name="Freihandform: Form 12">
+              <a:extLst>
+                <a:ext uri="{FF2B5EF4-FFF2-40B4-BE49-F238E27FC236}">
+                  <a16:creationId xmlns:a16="http://schemas.microsoft.com/office/drawing/2014/main" id="{B28D0296-719B-B683-280E-50C7D5211230}"/>
+                </a:ext>
+              </a:extLst>
+            </p:cNvPr>
+            <p:cNvSpPr/>
+            <p:nvPr/>
+          </p:nvSpPr>
+          <p:spPr>
+            <a:xfrm flipV="1">
+              <a:off x="6391347" y="2731118"/>
+              <a:ext cx="1462223" cy="1573903"/>
+            </a:xfrm>
+            <a:custGeom>
+              <a:avLst/>
+              <a:gdLst>
+                <a:gd name="connsiteX0" fmla="*/ 371537 w 1462223"/>
+                <a:gd name="connsiteY0" fmla="*/ 1099431 h 1573903"/>
+                <a:gd name="connsiteX1" fmla="*/ 89514 w 1462223"/>
+                <a:gd name="connsiteY1" fmla="*/ 62617 h 1573903"/>
+                <a:gd name="connsiteX2" fmla="*/ 1084707 w 1462223"/>
+                <a:gd name="connsiteY2" fmla="*/ 467730 h 1573903"/>
+                <a:gd name="connsiteX3" fmla="*/ 1366731 w 1462223"/>
+                <a:gd name="connsiteY3" fmla="*/ 1504544 h 1573903"/>
+                <a:gd name="connsiteX4" fmla="*/ 371537 w 1462223"/>
+                <a:gd name="connsiteY4" fmla="*/ 1099431 h 1573903"/>
+              </a:gdLst>
+              <a:ahLst/>
+              <a:cxnLst>
+                <a:cxn ang="0">
+                  <a:pos x="connsiteX0" y="connsiteY0"/>
+                </a:cxn>
+                <a:cxn ang="0">
+                  <a:pos x="connsiteX1" y="connsiteY1"/>
+                </a:cxn>
+                <a:cxn ang="0">
+                  <a:pos x="connsiteX2" y="connsiteY2"/>
+                </a:cxn>
+                <a:cxn ang="0">
+                  <a:pos x="connsiteX3" y="connsiteY3"/>
+                </a:cxn>
+                <a:cxn ang="0">
+                  <a:pos x="connsiteX4" y="connsiteY4"/>
+                </a:cxn>
+              </a:cxnLst>
+              <a:rect l="l" t="t" r="r" b="b"/>
+              <a:pathLst>
+                <a:path w="1462223" h="1573903">
+                  <a:moveTo>
+                    <a:pt x="371537" y="1099431"/>
+                  </a:moveTo>
+                  <a:cubicBezTo>
+                    <a:pt x="19805" y="702337"/>
+                    <a:pt x="-106890" y="236582"/>
+                    <a:pt x="89514" y="62617"/>
+                  </a:cubicBezTo>
+                  <a:cubicBezTo>
+                    <a:pt x="285918" y="-111349"/>
+                    <a:pt x="732976" y="70636"/>
+                    <a:pt x="1084707" y="467730"/>
+                  </a:cubicBezTo>
+                  <a:cubicBezTo>
+                    <a:pt x="1436440" y="864824"/>
+                    <a:pt x="1563126" y="1330579"/>
+                    <a:pt x="1366731" y="1504544"/>
+                  </a:cubicBezTo>
+                  <a:cubicBezTo>
+                    <a:pt x="1170327" y="1678510"/>
+                    <a:pt x="723269" y="1496525"/>
+                    <a:pt x="371537" y="1099431"/>
+                  </a:cubicBezTo>
+                </a:path>
+              </a:pathLst>
+            </a:custGeom>
+            <a:solidFill>
+              <a:srgbClr val="000000"/>
+            </a:solidFill>
+            <a:ln w="852" cap="flat">
+              <a:noFill/>
+              <a:prstDash val="solid"/>
+              <a:miter/>
+            </a:ln>
+          </p:spPr>
+          <p:txBody>
+            <a:bodyPr rtlCol="0" anchor="ctr"/>
+            <a:lstStyle/>
+            <a:p>
+              <a:endParaRPr lang="de-DE"/>
+            </a:p>
+          </p:txBody>
+        </p:sp>
+        <p:sp>
+          <p:nvSpPr>
+            <p:cNvPr id="14" name="Freihandform: Form 13">
+              <a:extLst>
+                <a:ext uri="{FF2B5EF4-FFF2-40B4-BE49-F238E27FC236}">
+                  <a16:creationId xmlns:a16="http://schemas.microsoft.com/office/drawing/2014/main" id="{8FD53F38-9B57-1B09-F6F4-457E94BCBCE6}"/>
+                </a:ext>
+              </a:extLst>
+            </p:cNvPr>
+            <p:cNvSpPr/>
+            <p:nvPr/>
+          </p:nvSpPr>
+          <p:spPr>
+            <a:xfrm flipV="1">
+              <a:off x="6391347" y="2731118"/>
+              <a:ext cx="1462223" cy="1573903"/>
+            </a:xfrm>
+            <a:custGeom>
+              <a:avLst/>
+              <a:gdLst>
+                <a:gd name="connsiteX0" fmla="*/ 371537 w 1462223"/>
+                <a:gd name="connsiteY0" fmla="*/ 1099431 h 1573903"/>
+                <a:gd name="connsiteX1" fmla="*/ 89514 w 1462223"/>
+                <a:gd name="connsiteY1" fmla="*/ 62617 h 1573903"/>
+                <a:gd name="connsiteX2" fmla="*/ 1084707 w 1462223"/>
+                <a:gd name="connsiteY2" fmla="*/ 467730 h 1573903"/>
+                <a:gd name="connsiteX3" fmla="*/ 1366731 w 1462223"/>
+                <a:gd name="connsiteY3" fmla="*/ 1504544 h 1573903"/>
+                <a:gd name="connsiteX4" fmla="*/ 371537 w 1462223"/>
+                <a:gd name="connsiteY4" fmla="*/ 1099431 h 1573903"/>
+              </a:gdLst>
+              <a:ahLst/>
+              <a:cxnLst>
+                <a:cxn ang="0">
+                  <a:pos x="connsiteX0" y="connsiteY0"/>
+                </a:cxn>
+                <a:cxn ang="0">
+                  <a:pos x="connsiteX1" y="connsiteY1"/>
+                </a:cxn>
+                <a:cxn ang="0">
+                  <a:pos x="connsiteX2" y="connsiteY2"/>
+                </a:cxn>
+                <a:cxn ang="0">
+                  <a:pos x="connsiteX3" y="connsiteY3"/>
+                </a:cxn>
+                <a:cxn ang="0">
+                  <a:pos x="connsiteX4" y="connsiteY4"/>
+                </a:cxn>
+              </a:cxnLst>
+              <a:rect l="l" t="t" r="r" b="b"/>
+              <a:pathLst>
+                <a:path w="1462223" h="1573903">
+                  <a:moveTo>
+                    <a:pt x="371537" y="1099431"/>
+                  </a:moveTo>
+                  <a:cubicBezTo>
+                    <a:pt x="19805" y="702337"/>
+                    <a:pt x="-106890" y="236582"/>
+                    <a:pt x="89514" y="62617"/>
+                  </a:cubicBezTo>
+                  <a:cubicBezTo>
+                    <a:pt x="285918" y="-111349"/>
+                    <a:pt x="732976" y="70636"/>
+                    <a:pt x="1084707" y="467730"/>
+                  </a:cubicBezTo>
+                  <a:cubicBezTo>
+                    <a:pt x="1436440" y="864824"/>
+                    <a:pt x="1563126" y="1330579"/>
+                    <a:pt x="1366731" y="1504544"/>
+                  </a:cubicBezTo>
+                  <a:cubicBezTo>
+                    <a:pt x="1170327" y="1678510"/>
+                    <a:pt x="723269" y="1496525"/>
+                    <a:pt x="371537" y="1099431"/>
+                  </a:cubicBezTo>
+                  <a:close/>
+                </a:path>
+              </a:pathLst>
+            </a:custGeom>
+            <a:noFill/>
+            <a:ln w="1841" cap="flat">
+              <a:solidFill>
+                <a:srgbClr val="231F20"/>
+              </a:solidFill>
+              <a:prstDash val="solid"/>
+              <a:miter/>
+            </a:ln>
+          </p:spPr>
+          <p:txBody>
+            <a:bodyPr rtlCol="0" anchor="ctr"/>
+            <a:lstStyle/>
+            <a:p>
+              <a:endParaRPr lang="de-DE"/>
+            </a:p>
+          </p:txBody>
+        </p:sp>
+      </p:grpSp>
+      <p:grpSp>
+        <p:nvGrpSpPr>
+          <p:cNvPr id="20" name="Gruppieren 19">
+            <a:extLst>
+              <a:ext uri="{FF2B5EF4-FFF2-40B4-BE49-F238E27FC236}">
+                <a16:creationId xmlns:a16="http://schemas.microsoft.com/office/drawing/2014/main" id="{1F03E160-6449-BDCE-EA60-9AE65D28C4ED}"/>
+              </a:ext>
+            </a:extLst>
+          </p:cNvPr>
+          <p:cNvGrpSpPr/>
+          <p:nvPr/>
+        </p:nvGrpSpPr>
+        <p:grpSpPr>
+          <a:xfrm>
+            <a:off x="1495485" y="2340262"/>
+            <a:ext cx="4996623" cy="5215104"/>
+            <a:chOff x="1651004" y="3726744"/>
+            <a:chExt cx="2987502" cy="2973068"/>
+          </a:xfrm>
+        </p:grpSpPr>
+        <p:sp>
+          <p:nvSpPr>
+            <p:cNvPr id="17" name="Bogen 16">
+              <a:extLst>
+                <a:ext uri="{FF2B5EF4-FFF2-40B4-BE49-F238E27FC236}">
+                  <a16:creationId xmlns:a16="http://schemas.microsoft.com/office/drawing/2014/main" id="{BB19793F-4601-DE08-02DD-C9F163B8A599}"/>
+                </a:ext>
+              </a:extLst>
+            </p:cNvPr>
+            <p:cNvSpPr/>
+            <p:nvPr/>
+          </p:nvSpPr>
+          <p:spPr>
+            <a:xfrm>
+              <a:off x="2306786" y="3726744"/>
+              <a:ext cx="2331720" cy="2295144"/>
+            </a:xfrm>
+            <a:prstGeom prst="arc">
+              <a:avLst/>
+            </a:prstGeom>
+            <a:ln w="190500" cap="rnd">
+              <a:solidFill>
+                <a:schemeClr val="bg1"/>
+              </a:solidFill>
+            </a:ln>
+          </p:spPr>
+          <p:style>
+            <a:lnRef idx="2">
+              <a:schemeClr val="accent1"/>
+            </a:lnRef>
+            <a:fillRef idx="0">
+              <a:schemeClr val="accent1"/>
+            </a:fillRef>
+            <a:effectRef idx="1">
+              <a:schemeClr val="accent1"/>
+            </a:effectRef>
+            <a:fontRef idx="minor">
+              <a:schemeClr val="tx1"/>
+            </a:fontRef>
+          </p:style>
+          <p:txBody>
+            <a:bodyPr rtlCol="0" anchor="ctr"/>
+            <a:lstStyle/>
+            <a:p>
+              <a:pPr algn="ctr"/>
+              <a:endParaRPr lang="de-DE"/>
+            </a:p>
+          </p:txBody>
+        </p:sp>
+        <p:sp>
+          <p:nvSpPr>
+            <p:cNvPr id="18" name="Bogen 17">
+              <a:extLst>
+                <a:ext uri="{FF2B5EF4-FFF2-40B4-BE49-F238E27FC236}">
+                  <a16:creationId xmlns:a16="http://schemas.microsoft.com/office/drawing/2014/main" id="{EDE7F55F-92CD-603E-0B62-34F02B0C6BE3}"/>
+                </a:ext>
+              </a:extLst>
+            </p:cNvPr>
+            <p:cNvSpPr/>
+            <p:nvPr/>
+          </p:nvSpPr>
+          <p:spPr>
+            <a:xfrm>
+              <a:off x="1978895" y="4065706"/>
+              <a:ext cx="2331720" cy="2295144"/>
+            </a:xfrm>
+            <a:prstGeom prst="arc">
+              <a:avLst/>
+            </a:prstGeom>
+            <a:ln w="190500" cap="rnd">
+              <a:solidFill>
+                <a:schemeClr val="bg1"/>
+              </a:solidFill>
+            </a:ln>
+          </p:spPr>
+          <p:style>
+            <a:lnRef idx="2">
+              <a:schemeClr val="accent1"/>
+            </a:lnRef>
+            <a:fillRef idx="0">
+              <a:schemeClr val="accent1"/>
+            </a:fillRef>
+            <a:effectRef idx="1">
+              <a:schemeClr val="accent1"/>
+            </a:effectRef>
+            <a:fontRef idx="minor">
+              <a:schemeClr val="tx1"/>
+            </a:fontRef>
+          </p:style>
+          <p:txBody>
+            <a:bodyPr rtlCol="0" anchor="ctr"/>
+            <a:lstStyle/>
+            <a:p>
+              <a:pPr algn="ctr"/>
+              <a:endParaRPr lang="de-DE"/>
+            </a:p>
+          </p:txBody>
+        </p:sp>
+        <p:sp>
+          <p:nvSpPr>
+            <p:cNvPr id="19" name="Bogen 18">
+              <a:extLst>
+                <a:ext uri="{FF2B5EF4-FFF2-40B4-BE49-F238E27FC236}">
+                  <a16:creationId xmlns:a16="http://schemas.microsoft.com/office/drawing/2014/main" id="{1DF0921E-52D0-FD67-F583-A2394A327BD5}"/>
+                </a:ext>
+              </a:extLst>
+            </p:cNvPr>
+            <p:cNvSpPr/>
+            <p:nvPr/>
+          </p:nvSpPr>
+          <p:spPr>
+            <a:xfrm>
+              <a:off x="1651004" y="4404668"/>
+              <a:ext cx="2331720" cy="2295144"/>
+            </a:xfrm>
+            <a:prstGeom prst="arc">
+              <a:avLst/>
+            </a:prstGeom>
+            <a:ln w="190500" cap="rnd">
+              <a:solidFill>
+                <a:schemeClr val="bg1"/>
+              </a:solidFill>
+            </a:ln>
+          </p:spPr>
+          <p:style>
+            <a:lnRef idx="2">
+              <a:schemeClr val="accent1"/>
+            </a:lnRef>
+            <a:fillRef idx="0">
+              <a:schemeClr val="accent1"/>
+            </a:fillRef>
+            <a:effectRef idx="1">
+              <a:schemeClr val="accent1"/>
+            </a:effectRef>
+            <a:fontRef idx="minor">
+              <a:schemeClr val="tx1"/>
+            </a:fontRef>
+          </p:style>
+          <p:txBody>
+            <a:bodyPr rtlCol="0" anchor="ctr"/>
+            <a:lstStyle/>
+            <a:p>
+              <a:pPr algn="ctr"/>
+              <a:endParaRPr lang="de-DE"/>
+            </a:p>
+          </p:txBody>
+        </p:sp>
+      </p:grpSp>
+    </p:spTree>
+    <p:extLst>
+      <p:ext uri="{BB962C8B-B14F-4D97-AF65-F5344CB8AC3E}">
+        <p14:creationId xmlns:p14="http://schemas.microsoft.com/office/powerpoint/2010/main" val="1684460484"/>
+      </p:ext>
+    </p:extLst>
+  </p:cSld>
+  <p:clrMapOvr>
+    <a:masterClrMapping/>
+  </p:clrMapOvr>
+</p:sld>
+</file>
+
+<file path=ppt/slides/slide4.xml><?xml version="1.0" encoding="utf-8"?>
+<p:sld xmlns:a="http://schemas.openxmlformats.org/drawingml/2006/main" xmlns:r="http://schemas.openxmlformats.org/officeDocument/2006/relationships" xmlns:p="http://schemas.openxmlformats.org/presentationml/2006/main">
+  <p:cSld>
+    <p:bg>
+      <p:bgPr>
+        <a:solidFill>
+          <a:schemeClr val="bg1"/>
+        </a:solidFill>
+        <a:effectLst/>
+      </p:bgPr>
+    </p:bg>
+    <p:spTree>
+      <p:nvGrpSpPr>
+        <p:cNvPr id="1" name=""/>
+        <p:cNvGrpSpPr/>
+        <p:nvPr/>
+      </p:nvGrpSpPr>
+      <p:grpSpPr>
+        <a:xfrm>
+          <a:off x="0" y="0"/>
+          <a:ext cx="0" cy="0"/>
+          <a:chOff x="0" y="0"/>
+          <a:chExt cx="0" cy="0"/>
+        </a:xfrm>
+      </p:grpSpPr>
+      <p:sp>
+        <p:nvSpPr>
+          <p:cNvPr id="15" name="Rechteck: abgerundete Ecken 14">
+            <a:extLst>
+              <a:ext uri="{FF2B5EF4-FFF2-40B4-BE49-F238E27FC236}">
+                <a16:creationId xmlns:a16="http://schemas.microsoft.com/office/drawing/2014/main" id="{7EABC2F2-560C-0376-8481-BCF57ED6DAA1}"/>
+              </a:ext>
+            </a:extLst>
+          </p:cNvPr>
+          <p:cNvSpPr/>
+          <p:nvPr/>
+        </p:nvSpPr>
+        <p:spPr>
+          <a:xfrm>
+            <a:off x="2204625" y="189000"/>
+            <a:ext cx="6480000" cy="6480000"/>
+          </a:xfrm>
+          <a:prstGeom prst="roundRect">
+            <a:avLst/>
+          </a:prstGeom>
+          <a:solidFill>
+            <a:schemeClr val="tx1"/>
+          </a:solidFill>
+        </p:spPr>
+        <p:style>
+          <a:lnRef idx="2">
+            <a:schemeClr val="accent1">
+              <a:shade val="15000"/>
+            </a:schemeClr>
+          </a:lnRef>
+          <a:fillRef idx="1">
+            <a:schemeClr val="accent1"/>
+          </a:fillRef>
+          <a:effectRef idx="0">
+            <a:schemeClr val="accent1"/>
+          </a:effectRef>
+          <a:fontRef idx="minor">
+            <a:schemeClr val="lt1"/>
+          </a:fontRef>
+        </p:style>
+        <p:txBody>
+          <a:bodyPr rtlCol="0" anchor="ctr"/>
+          <a:lstStyle/>
+          <a:p>
+            <a:pPr algn="ctr"/>
+            <a:endParaRPr lang="de-DE"/>
+          </a:p>
+        </p:txBody>
+      </p:sp>
+      <p:grpSp>
+        <p:nvGrpSpPr>
+          <p:cNvPr id="6" name="Grafik 4">
+            <a:extLst>
+              <a:ext uri="{FF2B5EF4-FFF2-40B4-BE49-F238E27FC236}">
+                <a16:creationId xmlns:a16="http://schemas.microsoft.com/office/drawing/2014/main" id="{FE4752A5-87F6-DC8B-13AC-1EF48FDAF556}"/>
+              </a:ext>
+            </a:extLst>
+          </p:cNvPr>
+          <p:cNvGrpSpPr/>
+          <p:nvPr/>
+        </p:nvGrpSpPr>
+        <p:grpSpPr>
+          <a:xfrm>
+            <a:off x="6492287" y="780842"/>
+            <a:ext cx="1394772" cy="2295144"/>
+            <a:chOff x="4032288" y="49226"/>
+            <a:chExt cx="4129542" cy="6760862"/>
+          </a:xfrm>
+        </p:grpSpPr>
+        <p:sp>
+          <p:nvSpPr>
+            <p:cNvPr id="7" name="Freihandform: Form 6">
+              <a:extLst>
+                <a:ext uri="{FF2B5EF4-FFF2-40B4-BE49-F238E27FC236}">
+                  <a16:creationId xmlns:a16="http://schemas.microsoft.com/office/drawing/2014/main" id="{E96B609A-A200-BFE8-6146-3BFD94EE6120}"/>
+                </a:ext>
+              </a:extLst>
+            </p:cNvPr>
+            <p:cNvSpPr/>
+            <p:nvPr/>
+          </p:nvSpPr>
+          <p:spPr>
+            <a:xfrm flipV="1">
+              <a:off x="4032288" y="49226"/>
+              <a:ext cx="4129542" cy="6760862"/>
+            </a:xfrm>
+            <a:custGeom>
+              <a:avLst/>
+              <a:gdLst>
+                <a:gd name="connsiteX0" fmla="*/ 2062825 w 4129542"/>
+                <a:gd name="connsiteY0" fmla="*/ -3486 h 6760862"/>
+                <a:gd name="connsiteX1" fmla="*/ 264879 w 4129542"/>
+                <a:gd name="connsiteY1" fmla="*/ 2692249 h 6760862"/>
+                <a:gd name="connsiteX2" fmla="*/ 264879 w 4129542"/>
+                <a:gd name="connsiteY2" fmla="*/ 4611001 h 6760862"/>
+                <a:gd name="connsiteX3" fmla="*/ 1110420 w 4129542"/>
+                <a:gd name="connsiteY3" fmla="*/ 6757373 h 6760862"/>
+                <a:gd name="connsiteX4" fmla="*/ 1785225 w 4129542"/>
+                <a:gd name="connsiteY4" fmla="*/ 5302066 h 6760862"/>
+                <a:gd name="connsiteX5" fmla="*/ 2340426 w 4129542"/>
+                <a:gd name="connsiteY5" fmla="*/ 5302066 h 6760862"/>
+                <a:gd name="connsiteX6" fmla="*/ 3015231 w 4129542"/>
+                <a:gd name="connsiteY6" fmla="*/ 6757373 h 6760862"/>
+                <a:gd name="connsiteX7" fmla="*/ 3860772 w 4129542"/>
+                <a:gd name="connsiteY7" fmla="*/ 4611001 h 6760862"/>
+                <a:gd name="connsiteX8" fmla="*/ 3860772 w 4129542"/>
+                <a:gd name="connsiteY8" fmla="*/ 2692249 h 6760862"/>
+                <a:gd name="connsiteX9" fmla="*/ 2062825 w 4129542"/>
+                <a:gd name="connsiteY9" fmla="*/ -3486 h 6760862"/>
+              </a:gdLst>
+              <a:ahLst/>
+              <a:cxnLst>
+                <a:cxn ang="0">
+                  <a:pos x="connsiteX0" y="connsiteY0"/>
+                </a:cxn>
+                <a:cxn ang="0">
+                  <a:pos x="connsiteX1" y="connsiteY1"/>
+                </a:cxn>
+                <a:cxn ang="0">
+                  <a:pos x="connsiteX2" y="connsiteY2"/>
+                </a:cxn>
+                <a:cxn ang="0">
+                  <a:pos x="connsiteX3" y="connsiteY3"/>
+                </a:cxn>
+                <a:cxn ang="0">
+                  <a:pos x="connsiteX4" y="connsiteY4"/>
+                </a:cxn>
+                <a:cxn ang="0">
+                  <a:pos x="connsiteX5" y="connsiteY5"/>
+                </a:cxn>
+                <a:cxn ang="0">
+                  <a:pos x="connsiteX6" y="connsiteY6"/>
+                </a:cxn>
+                <a:cxn ang="0">
+                  <a:pos x="connsiteX7" y="connsiteY7"/>
+                </a:cxn>
+                <a:cxn ang="0">
+                  <a:pos x="connsiteX8" y="connsiteY8"/>
+                </a:cxn>
+                <a:cxn ang="0">
+                  <a:pos x="connsiteX9" y="connsiteY9"/>
+                </a:cxn>
+              </a:cxnLst>
+              <a:rect l="l" t="t" r="r" b="b"/>
+              <a:pathLst>
+                <a:path w="4129542" h="6760862">
+                  <a:moveTo>
+                    <a:pt x="2062825" y="-3486"/>
+                  </a:moveTo>
+                  <a:cubicBezTo>
+                    <a:pt x="2060959" y="-6279"/>
+                    <a:pt x="433066" y="2440078"/>
+                    <a:pt x="264879" y="2692249"/>
+                  </a:cubicBezTo>
+                  <a:cubicBezTo>
+                    <a:pt x="-191994" y="3377255"/>
+                    <a:pt x="26635" y="4006221"/>
+                    <a:pt x="264879" y="4611001"/>
+                  </a:cubicBezTo>
+                  <a:lnTo>
+                    <a:pt x="1110420" y="6757373"/>
+                  </a:lnTo>
+                  <a:lnTo>
+                    <a:pt x="1785225" y="5302066"/>
+                  </a:lnTo>
+                  <a:cubicBezTo>
+                    <a:pt x="1928631" y="5351553"/>
+                    <a:pt x="2197019" y="5351212"/>
+                    <a:pt x="2340426" y="5302066"/>
+                  </a:cubicBezTo>
+                  <a:lnTo>
+                    <a:pt x="3015231" y="6757373"/>
+                  </a:lnTo>
+                  <a:lnTo>
+                    <a:pt x="3860772" y="4611001"/>
+                  </a:lnTo>
+                  <a:cubicBezTo>
+                    <a:pt x="4099009" y="4006221"/>
+                    <a:pt x="4317638" y="3377255"/>
+                    <a:pt x="3860772" y="2692249"/>
+                  </a:cubicBezTo>
+                  <a:lnTo>
+                    <a:pt x="2062825" y="-3486"/>
+                  </a:lnTo>
+                </a:path>
+              </a:pathLst>
+            </a:custGeom>
+            <a:solidFill>
+              <a:srgbClr val="FFFFFF"/>
+            </a:solidFill>
+            <a:ln w="852" cap="flat">
+              <a:noFill/>
+              <a:prstDash val="solid"/>
+              <a:miter/>
+            </a:ln>
+          </p:spPr>
+          <p:txBody>
+            <a:bodyPr rtlCol="0" anchor="ctr"/>
+            <a:lstStyle/>
+            <a:p>
+              <a:endParaRPr lang="de-DE"/>
+            </a:p>
+          </p:txBody>
+        </p:sp>
+        <p:sp>
+          <p:nvSpPr>
+            <p:cNvPr id="8" name="Freihandform: Form 7">
+              <a:extLst>
+                <a:ext uri="{FF2B5EF4-FFF2-40B4-BE49-F238E27FC236}">
+                  <a16:creationId xmlns:a16="http://schemas.microsoft.com/office/drawing/2014/main" id="{CBEC3B89-DCE1-AF29-ACAD-DB921847FDC3}"/>
+                </a:ext>
+              </a:extLst>
+            </p:cNvPr>
+            <p:cNvSpPr/>
+            <p:nvPr/>
+          </p:nvSpPr>
+          <p:spPr>
+            <a:xfrm flipV="1">
+              <a:off x="4032288" y="49226"/>
+              <a:ext cx="4129542" cy="6760862"/>
+            </a:xfrm>
+            <a:custGeom>
+              <a:avLst/>
+              <a:gdLst>
+                <a:gd name="connsiteX0" fmla="*/ 2062825 w 4129542"/>
+                <a:gd name="connsiteY0" fmla="*/ -3486 h 6760862"/>
+                <a:gd name="connsiteX1" fmla="*/ 264879 w 4129542"/>
+                <a:gd name="connsiteY1" fmla="*/ 2692249 h 6760862"/>
+                <a:gd name="connsiteX2" fmla="*/ 264879 w 4129542"/>
+                <a:gd name="connsiteY2" fmla="*/ 4611001 h 6760862"/>
+                <a:gd name="connsiteX3" fmla="*/ 1110420 w 4129542"/>
+                <a:gd name="connsiteY3" fmla="*/ 6757373 h 6760862"/>
+                <a:gd name="connsiteX4" fmla="*/ 1785225 w 4129542"/>
+                <a:gd name="connsiteY4" fmla="*/ 5302066 h 6760862"/>
+                <a:gd name="connsiteX5" fmla="*/ 2340426 w 4129542"/>
+                <a:gd name="connsiteY5" fmla="*/ 5302066 h 6760862"/>
+                <a:gd name="connsiteX6" fmla="*/ 3015231 w 4129542"/>
+                <a:gd name="connsiteY6" fmla="*/ 6757373 h 6760862"/>
+                <a:gd name="connsiteX7" fmla="*/ 3860772 w 4129542"/>
+                <a:gd name="connsiteY7" fmla="*/ 4611001 h 6760862"/>
+                <a:gd name="connsiteX8" fmla="*/ 3860772 w 4129542"/>
+                <a:gd name="connsiteY8" fmla="*/ 2692249 h 6760862"/>
+              </a:gdLst>
+              <a:ahLst/>
+              <a:cxnLst>
+                <a:cxn ang="0">
+                  <a:pos x="connsiteX0" y="connsiteY0"/>
+                </a:cxn>
+                <a:cxn ang="0">
+                  <a:pos x="connsiteX1" y="connsiteY1"/>
+                </a:cxn>
+                <a:cxn ang="0">
+                  <a:pos x="connsiteX2" y="connsiteY2"/>
+                </a:cxn>
+                <a:cxn ang="0">
+                  <a:pos x="connsiteX3" y="connsiteY3"/>
+                </a:cxn>
+                <a:cxn ang="0">
+                  <a:pos x="connsiteX4" y="connsiteY4"/>
+                </a:cxn>
+                <a:cxn ang="0">
+                  <a:pos x="connsiteX5" y="connsiteY5"/>
+                </a:cxn>
+                <a:cxn ang="0">
+                  <a:pos x="connsiteX6" y="connsiteY6"/>
+                </a:cxn>
+                <a:cxn ang="0">
+                  <a:pos x="connsiteX7" y="connsiteY7"/>
+                </a:cxn>
+                <a:cxn ang="0">
+                  <a:pos x="connsiteX8" y="connsiteY8"/>
+                </a:cxn>
+              </a:cxnLst>
+              <a:rect l="l" t="t" r="r" b="b"/>
+              <a:pathLst>
+                <a:path w="4129542" h="6760862">
+                  <a:moveTo>
+                    <a:pt x="2062825" y="-3486"/>
+                  </a:moveTo>
+                  <a:cubicBezTo>
+                    <a:pt x="2060959" y="-6279"/>
+                    <a:pt x="433066" y="2440078"/>
+                    <a:pt x="264879" y="2692249"/>
+                  </a:cubicBezTo>
+                  <a:cubicBezTo>
+                    <a:pt x="-191994" y="3377255"/>
+                    <a:pt x="26635" y="4006221"/>
+                    <a:pt x="264879" y="4611001"/>
+                  </a:cubicBezTo>
+                  <a:lnTo>
+                    <a:pt x="1110420" y="6757373"/>
+                  </a:lnTo>
+                  <a:lnTo>
+                    <a:pt x="1785225" y="5302066"/>
+                  </a:lnTo>
+                  <a:cubicBezTo>
+                    <a:pt x="1928631" y="5351553"/>
+                    <a:pt x="2197019" y="5351212"/>
+                    <a:pt x="2340426" y="5302066"/>
+                  </a:cubicBezTo>
+                  <a:lnTo>
+                    <a:pt x="3015231" y="6757373"/>
+                  </a:lnTo>
+                  <a:lnTo>
+                    <a:pt x="3860772" y="4611001"/>
+                  </a:lnTo>
+                  <a:cubicBezTo>
+                    <a:pt x="4099009" y="4006221"/>
+                    <a:pt x="4317638" y="3377255"/>
+                    <a:pt x="3860772" y="2692249"/>
+                  </a:cubicBezTo>
+                  <a:close/>
+                </a:path>
+              </a:pathLst>
+            </a:custGeom>
+            <a:noFill/>
+            <a:ln w="1841" cap="flat">
+              <a:solidFill>
+                <a:srgbClr val="231F20"/>
+              </a:solidFill>
+              <a:prstDash val="solid"/>
+              <a:miter/>
+            </a:ln>
+          </p:spPr>
+          <p:txBody>
+            <a:bodyPr rtlCol="0" anchor="ctr"/>
+            <a:lstStyle/>
+            <a:p>
+              <a:endParaRPr lang="de-DE"/>
+            </a:p>
+          </p:txBody>
+        </p:sp>
+        <p:sp>
+          <p:nvSpPr>
+            <p:cNvPr id="9" name="Freihandform: Form 8">
+              <a:extLst>
+                <a:ext uri="{FF2B5EF4-FFF2-40B4-BE49-F238E27FC236}">
+                  <a16:creationId xmlns:a16="http://schemas.microsoft.com/office/drawing/2014/main" id="{42340D18-EBB4-6BB7-0ACB-E73601C02058}"/>
+                </a:ext>
+              </a:extLst>
+            </p:cNvPr>
+            <p:cNvSpPr/>
+            <p:nvPr/>
+          </p:nvSpPr>
+          <p:spPr>
+            <a:xfrm flipV="1">
+              <a:off x="4340540" y="2731118"/>
+              <a:ext cx="1462221" cy="1573903"/>
+            </a:xfrm>
+            <a:custGeom>
+              <a:avLst/>
+              <a:gdLst>
+                <a:gd name="connsiteX0" fmla="*/ 1086785 w 1462221"/>
+                <a:gd name="connsiteY0" fmla="*/ 1099431 h 1573903"/>
+                <a:gd name="connsiteX1" fmla="*/ 1368816 w 1462221"/>
+                <a:gd name="connsiteY1" fmla="*/ 62617 h 1573903"/>
+                <a:gd name="connsiteX2" fmla="*/ 373620 w 1462221"/>
+                <a:gd name="connsiteY2" fmla="*/ 467730 h 1573903"/>
+                <a:gd name="connsiteX3" fmla="*/ 91599 w 1462221"/>
+                <a:gd name="connsiteY3" fmla="*/ 1504544 h 1573903"/>
+                <a:gd name="connsiteX4" fmla="*/ 1086785 w 1462221"/>
+                <a:gd name="connsiteY4" fmla="*/ 1099431 h 1573903"/>
+              </a:gdLst>
+              <a:ahLst/>
+              <a:cxnLst>
+                <a:cxn ang="0">
+                  <a:pos x="connsiteX0" y="connsiteY0"/>
+                </a:cxn>
+                <a:cxn ang="0">
+                  <a:pos x="connsiteX1" y="connsiteY1"/>
+                </a:cxn>
+                <a:cxn ang="0">
+                  <a:pos x="connsiteX2" y="connsiteY2"/>
+                </a:cxn>
+                <a:cxn ang="0">
+                  <a:pos x="connsiteX3" y="connsiteY3"/>
+                </a:cxn>
+                <a:cxn ang="0">
+                  <a:pos x="connsiteX4" y="connsiteY4"/>
+                </a:cxn>
+              </a:cxnLst>
+              <a:rect l="l" t="t" r="r" b="b"/>
+              <a:pathLst>
+                <a:path w="1462221" h="1573903">
+                  <a:moveTo>
+                    <a:pt x="1086785" y="1099431"/>
+                  </a:moveTo>
+                  <a:cubicBezTo>
+                    <a:pt x="1438517" y="702337"/>
+                    <a:pt x="1565211" y="236582"/>
+                    <a:pt x="1368816" y="62617"/>
+                  </a:cubicBezTo>
+                  <a:cubicBezTo>
+                    <a:pt x="1172412" y="-111349"/>
+                    <a:pt x="725355" y="70636"/>
+                    <a:pt x="373620" y="467730"/>
+                  </a:cubicBezTo>
+                  <a:cubicBezTo>
+                    <a:pt x="21890" y="864824"/>
+                    <a:pt x="-104804" y="1330579"/>
+                    <a:pt x="91599" y="1504544"/>
+                  </a:cubicBezTo>
+                  <a:cubicBezTo>
+                    <a:pt x="288001" y="1678510"/>
+                    <a:pt x="735052" y="1496525"/>
+                    <a:pt x="1086785" y="1099431"/>
+                  </a:cubicBezTo>
+                </a:path>
+              </a:pathLst>
+            </a:custGeom>
+            <a:solidFill>
+              <a:srgbClr val="000000"/>
+            </a:solidFill>
+            <a:ln w="852" cap="flat">
+              <a:noFill/>
+              <a:prstDash val="solid"/>
+              <a:miter/>
+            </a:ln>
+          </p:spPr>
+          <p:txBody>
+            <a:bodyPr rtlCol="0" anchor="ctr"/>
+            <a:lstStyle/>
+            <a:p>
+              <a:endParaRPr lang="de-DE"/>
+            </a:p>
+          </p:txBody>
+        </p:sp>
+        <p:sp>
+          <p:nvSpPr>
+            <p:cNvPr id="10" name="Freihandform: Form 9">
+              <a:extLst>
+                <a:ext uri="{FF2B5EF4-FFF2-40B4-BE49-F238E27FC236}">
+                  <a16:creationId xmlns:a16="http://schemas.microsoft.com/office/drawing/2014/main" id="{77AA5D95-034B-3CC6-ACB9-5C3B248B60C3}"/>
+                </a:ext>
+              </a:extLst>
+            </p:cNvPr>
+            <p:cNvSpPr/>
+            <p:nvPr/>
+          </p:nvSpPr>
+          <p:spPr>
+            <a:xfrm flipV="1">
+              <a:off x="4340540" y="2731118"/>
+              <a:ext cx="1462221" cy="1573903"/>
+            </a:xfrm>
+            <a:custGeom>
+              <a:avLst/>
+              <a:gdLst>
+                <a:gd name="connsiteX0" fmla="*/ 1086785 w 1462221"/>
+                <a:gd name="connsiteY0" fmla="*/ 1099431 h 1573903"/>
+                <a:gd name="connsiteX1" fmla="*/ 1368816 w 1462221"/>
+                <a:gd name="connsiteY1" fmla="*/ 62617 h 1573903"/>
+                <a:gd name="connsiteX2" fmla="*/ 373620 w 1462221"/>
+                <a:gd name="connsiteY2" fmla="*/ 467730 h 1573903"/>
+                <a:gd name="connsiteX3" fmla="*/ 91599 w 1462221"/>
+                <a:gd name="connsiteY3" fmla="*/ 1504544 h 1573903"/>
+                <a:gd name="connsiteX4" fmla="*/ 1086785 w 1462221"/>
+                <a:gd name="connsiteY4" fmla="*/ 1099431 h 1573903"/>
+              </a:gdLst>
+              <a:ahLst/>
+              <a:cxnLst>
+                <a:cxn ang="0">
+                  <a:pos x="connsiteX0" y="connsiteY0"/>
+                </a:cxn>
+                <a:cxn ang="0">
+                  <a:pos x="connsiteX1" y="connsiteY1"/>
+                </a:cxn>
+                <a:cxn ang="0">
+                  <a:pos x="connsiteX2" y="connsiteY2"/>
+                </a:cxn>
+                <a:cxn ang="0">
+                  <a:pos x="connsiteX3" y="connsiteY3"/>
+                </a:cxn>
+                <a:cxn ang="0">
+                  <a:pos x="connsiteX4" y="connsiteY4"/>
+                </a:cxn>
+              </a:cxnLst>
+              <a:rect l="l" t="t" r="r" b="b"/>
+              <a:pathLst>
+                <a:path w="1462221" h="1573903">
+                  <a:moveTo>
+                    <a:pt x="1086785" y="1099431"/>
+                  </a:moveTo>
+                  <a:cubicBezTo>
+                    <a:pt x="1438517" y="702337"/>
+                    <a:pt x="1565211" y="236582"/>
+                    <a:pt x="1368816" y="62617"/>
+                  </a:cubicBezTo>
+                  <a:cubicBezTo>
+                    <a:pt x="1172412" y="-111349"/>
+                    <a:pt x="725355" y="70636"/>
+                    <a:pt x="373620" y="467730"/>
+                  </a:cubicBezTo>
+                  <a:cubicBezTo>
+                    <a:pt x="21890" y="864824"/>
+                    <a:pt x="-104804" y="1330579"/>
+                    <a:pt x="91599" y="1504544"/>
+                  </a:cubicBezTo>
+                  <a:cubicBezTo>
+                    <a:pt x="288001" y="1678510"/>
+                    <a:pt x="735052" y="1496525"/>
+                    <a:pt x="1086785" y="1099431"/>
+                  </a:cubicBezTo>
+                  <a:close/>
+                </a:path>
+              </a:pathLst>
+            </a:custGeom>
+            <a:noFill/>
+            <a:ln w="1841" cap="flat">
+              <a:solidFill>
+                <a:srgbClr val="231F20"/>
+              </a:solidFill>
+              <a:prstDash val="solid"/>
+              <a:miter/>
+            </a:ln>
+          </p:spPr>
+          <p:txBody>
+            <a:bodyPr rtlCol="0" anchor="ctr"/>
+            <a:lstStyle/>
+            <a:p>
+              <a:endParaRPr lang="de-DE"/>
+            </a:p>
+          </p:txBody>
+        </p:sp>
+        <p:sp>
+          <p:nvSpPr>
+            <p:cNvPr id="11" name="Freihandform: Form 10">
+              <a:extLst>
+                <a:ext uri="{FF2B5EF4-FFF2-40B4-BE49-F238E27FC236}">
+                  <a16:creationId xmlns:a16="http://schemas.microsoft.com/office/drawing/2014/main" id="{D926C69E-A33B-9BC9-A4A0-384BF3FC5035}"/>
+                </a:ext>
+              </a:extLst>
+            </p:cNvPr>
+            <p:cNvSpPr/>
+            <p:nvPr/>
+          </p:nvSpPr>
+          <p:spPr>
+            <a:xfrm flipV="1">
+              <a:off x="5531070" y="4642847"/>
+              <a:ext cx="1131446" cy="973461"/>
+            </a:xfrm>
+            <a:custGeom>
+              <a:avLst/>
+              <a:gdLst>
+                <a:gd name="connsiteX0" fmla="*/ 678569 w 1131446"/>
+                <a:gd name="connsiteY0" fmla="*/ 906739 h 973461"/>
+                <a:gd name="connsiteX1" fmla="*/ 1114557 w 1131446"/>
+                <a:gd name="connsiteY1" fmla="*/ 150200 h 973461"/>
+                <a:gd name="connsiteX2" fmla="*/ 938222 w 1131446"/>
+                <a:gd name="connsiteY2" fmla="*/ 47486 h 973461"/>
+                <a:gd name="connsiteX3" fmla="*/ 564043 w 1131446"/>
+                <a:gd name="connsiteY3" fmla="*/ 696478 h 973461"/>
+                <a:gd name="connsiteX4" fmla="*/ 189362 w 1131446"/>
+                <a:gd name="connsiteY4" fmla="*/ 46736 h 973461"/>
+                <a:gd name="connsiteX5" fmla="*/ 11953 w 1131446"/>
+                <a:gd name="connsiteY5" fmla="*/ 150354 h 973461"/>
+                <a:gd name="connsiteX6" fmla="*/ 450140 w 1131446"/>
+                <a:gd name="connsiteY6" fmla="*/ 907676 h 973461"/>
+                <a:gd name="connsiteX7" fmla="*/ 678569 w 1131446"/>
+                <a:gd name="connsiteY7" fmla="*/ 906739 h 973461"/>
+              </a:gdLst>
+              <a:ahLst/>
+              <a:cxnLst>
+                <a:cxn ang="0">
+                  <a:pos x="connsiteX0" y="connsiteY0"/>
+                </a:cxn>
+                <a:cxn ang="0">
+                  <a:pos x="connsiteX1" y="connsiteY1"/>
+                </a:cxn>
+                <a:cxn ang="0">
+                  <a:pos x="connsiteX2" y="connsiteY2"/>
+                </a:cxn>
+                <a:cxn ang="0">
+                  <a:pos x="connsiteX3" y="connsiteY3"/>
+                </a:cxn>
+                <a:cxn ang="0">
+                  <a:pos x="connsiteX4" y="connsiteY4"/>
+                </a:cxn>
+                <a:cxn ang="0">
+                  <a:pos x="connsiteX5" y="connsiteY5"/>
+                </a:cxn>
+                <a:cxn ang="0">
+                  <a:pos x="connsiteX6" y="connsiteY6"/>
+                </a:cxn>
+                <a:cxn ang="0">
+                  <a:pos x="connsiteX7" y="connsiteY7"/>
+                </a:cxn>
+              </a:cxnLst>
+              <a:rect l="l" t="t" r="r" b="b"/>
+              <a:pathLst>
+                <a:path w="1131446" h="973461">
+                  <a:moveTo>
+                    <a:pt x="678569" y="906739"/>
+                  </a:moveTo>
+                  <a:lnTo>
+                    <a:pt x="1114557" y="150200"/>
+                  </a:lnTo>
+                  <a:cubicBezTo>
+                    <a:pt x="1182212" y="32820"/>
+                    <a:pt x="1001829" y="-62855"/>
+                    <a:pt x="938222" y="47486"/>
+                  </a:cubicBezTo>
+                  <a:lnTo>
+                    <a:pt x="564043" y="696478"/>
+                  </a:lnTo>
+                  <a:lnTo>
+                    <a:pt x="189362" y="46736"/>
+                  </a:lnTo>
+                  <a:cubicBezTo>
+                    <a:pt x="124979" y="-64917"/>
+                    <a:pt x="-52592" y="38794"/>
+                    <a:pt x="11953" y="150354"/>
+                  </a:cubicBezTo>
+                  <a:lnTo>
+                    <a:pt x="450140" y="907676"/>
+                  </a:lnTo>
+                  <a:cubicBezTo>
+                    <a:pt x="500487" y="994676"/>
+                    <a:pt x="628775" y="993134"/>
+                    <a:pt x="678569" y="906739"/>
+                  </a:cubicBezTo>
+                </a:path>
+              </a:pathLst>
+            </a:custGeom>
+            <a:solidFill>
+              <a:srgbClr val="000000"/>
+            </a:solidFill>
+            <a:ln w="852" cap="flat">
+              <a:noFill/>
+              <a:prstDash val="solid"/>
+              <a:miter/>
+            </a:ln>
+          </p:spPr>
+          <p:txBody>
+            <a:bodyPr rtlCol="0" anchor="ctr"/>
+            <a:lstStyle/>
+            <a:p>
+              <a:endParaRPr lang="de-DE"/>
+            </a:p>
+          </p:txBody>
+        </p:sp>
+        <p:sp>
+          <p:nvSpPr>
+            <p:cNvPr id="12" name="Freihandform: Form 11">
+              <a:extLst>
+                <a:ext uri="{FF2B5EF4-FFF2-40B4-BE49-F238E27FC236}">
+                  <a16:creationId xmlns:a16="http://schemas.microsoft.com/office/drawing/2014/main" id="{28B6948F-902E-A84C-A4AD-5CC9C14F7B76}"/>
+                </a:ext>
+              </a:extLst>
+            </p:cNvPr>
+            <p:cNvSpPr/>
+            <p:nvPr/>
+          </p:nvSpPr>
+          <p:spPr>
+            <a:xfrm flipV="1">
+              <a:off x="5531070" y="4642847"/>
+              <a:ext cx="1131446" cy="973461"/>
+            </a:xfrm>
+            <a:custGeom>
+              <a:avLst/>
+              <a:gdLst>
+                <a:gd name="connsiteX0" fmla="*/ 678569 w 1131446"/>
+                <a:gd name="connsiteY0" fmla="*/ 906739 h 973461"/>
+                <a:gd name="connsiteX1" fmla="*/ 1114557 w 1131446"/>
+                <a:gd name="connsiteY1" fmla="*/ 150200 h 973461"/>
+                <a:gd name="connsiteX2" fmla="*/ 938222 w 1131446"/>
+                <a:gd name="connsiteY2" fmla="*/ 47486 h 973461"/>
+                <a:gd name="connsiteX3" fmla="*/ 564043 w 1131446"/>
+                <a:gd name="connsiteY3" fmla="*/ 696478 h 973461"/>
+                <a:gd name="connsiteX4" fmla="*/ 189362 w 1131446"/>
+                <a:gd name="connsiteY4" fmla="*/ 46736 h 973461"/>
+                <a:gd name="connsiteX5" fmla="*/ 11953 w 1131446"/>
+                <a:gd name="connsiteY5" fmla="*/ 150354 h 973461"/>
+                <a:gd name="connsiteX6" fmla="*/ 450140 w 1131446"/>
+                <a:gd name="connsiteY6" fmla="*/ 907676 h 973461"/>
+                <a:gd name="connsiteX7" fmla="*/ 678569 w 1131446"/>
+                <a:gd name="connsiteY7" fmla="*/ 906739 h 973461"/>
+              </a:gdLst>
+              <a:ahLst/>
+              <a:cxnLst>
+                <a:cxn ang="0">
+                  <a:pos x="connsiteX0" y="connsiteY0"/>
+                </a:cxn>
+                <a:cxn ang="0">
+                  <a:pos x="connsiteX1" y="connsiteY1"/>
+                </a:cxn>
+                <a:cxn ang="0">
+                  <a:pos x="connsiteX2" y="connsiteY2"/>
+                </a:cxn>
+                <a:cxn ang="0">
+                  <a:pos x="connsiteX3" y="connsiteY3"/>
+                </a:cxn>
+                <a:cxn ang="0">
+                  <a:pos x="connsiteX4" y="connsiteY4"/>
+                </a:cxn>
+                <a:cxn ang="0">
+                  <a:pos x="connsiteX5" y="connsiteY5"/>
+                </a:cxn>
+                <a:cxn ang="0">
+                  <a:pos x="connsiteX6" y="connsiteY6"/>
+                </a:cxn>
+                <a:cxn ang="0">
+                  <a:pos x="connsiteX7" y="connsiteY7"/>
+                </a:cxn>
+              </a:cxnLst>
+              <a:rect l="l" t="t" r="r" b="b"/>
+              <a:pathLst>
+                <a:path w="1131446" h="973461">
+                  <a:moveTo>
+                    <a:pt x="678569" y="906739"/>
+                  </a:moveTo>
+                  <a:lnTo>
+                    <a:pt x="1114557" y="150200"/>
+                  </a:lnTo>
+                  <a:cubicBezTo>
+                    <a:pt x="1182212" y="32820"/>
+                    <a:pt x="1001829" y="-62855"/>
+                    <a:pt x="938222" y="47486"/>
+                  </a:cubicBezTo>
+                  <a:lnTo>
+                    <a:pt x="564043" y="696478"/>
+                  </a:lnTo>
+                  <a:lnTo>
+                    <a:pt x="189362" y="46736"/>
+                  </a:lnTo>
+                  <a:cubicBezTo>
+                    <a:pt x="124979" y="-64917"/>
+                    <a:pt x="-52592" y="38794"/>
+                    <a:pt x="11953" y="150354"/>
+                  </a:cubicBezTo>
+                  <a:lnTo>
+                    <a:pt x="450140" y="907676"/>
+                  </a:lnTo>
+                  <a:cubicBezTo>
+                    <a:pt x="500487" y="994676"/>
+                    <a:pt x="628775" y="993134"/>
+                    <a:pt x="678569" y="906739"/>
+                  </a:cubicBezTo>
+                  <a:close/>
+                </a:path>
+              </a:pathLst>
+            </a:custGeom>
+            <a:noFill/>
+            <a:ln w="1841" cap="flat">
+              <a:solidFill>
+                <a:srgbClr val="231F20"/>
+              </a:solidFill>
+              <a:prstDash val="solid"/>
+              <a:miter/>
+            </a:ln>
+          </p:spPr>
+          <p:txBody>
+            <a:bodyPr rtlCol="0" anchor="ctr"/>
+            <a:lstStyle/>
+            <a:p>
+              <a:endParaRPr lang="de-DE"/>
+            </a:p>
+          </p:txBody>
+        </p:sp>
+        <p:sp>
+          <p:nvSpPr>
+            <p:cNvPr id="13" name="Freihandform: Form 12">
+              <a:extLst>
+                <a:ext uri="{FF2B5EF4-FFF2-40B4-BE49-F238E27FC236}">
+                  <a16:creationId xmlns:a16="http://schemas.microsoft.com/office/drawing/2014/main" id="{B28D0296-719B-B683-280E-50C7D5211230}"/>
+                </a:ext>
+              </a:extLst>
+            </p:cNvPr>
+            <p:cNvSpPr/>
+            <p:nvPr/>
+          </p:nvSpPr>
+          <p:spPr>
+            <a:xfrm flipV="1">
+              <a:off x="6391347" y="2731118"/>
+              <a:ext cx="1462223" cy="1573903"/>
+            </a:xfrm>
+            <a:custGeom>
+              <a:avLst/>
+              <a:gdLst>
+                <a:gd name="connsiteX0" fmla="*/ 371537 w 1462223"/>
+                <a:gd name="connsiteY0" fmla="*/ 1099431 h 1573903"/>
+                <a:gd name="connsiteX1" fmla="*/ 89514 w 1462223"/>
+                <a:gd name="connsiteY1" fmla="*/ 62617 h 1573903"/>
+                <a:gd name="connsiteX2" fmla="*/ 1084707 w 1462223"/>
+                <a:gd name="connsiteY2" fmla="*/ 467730 h 1573903"/>
+                <a:gd name="connsiteX3" fmla="*/ 1366731 w 1462223"/>
+                <a:gd name="connsiteY3" fmla="*/ 1504544 h 1573903"/>
+                <a:gd name="connsiteX4" fmla="*/ 371537 w 1462223"/>
+                <a:gd name="connsiteY4" fmla="*/ 1099431 h 1573903"/>
+              </a:gdLst>
+              <a:ahLst/>
+              <a:cxnLst>
+                <a:cxn ang="0">
+                  <a:pos x="connsiteX0" y="connsiteY0"/>
+                </a:cxn>
+                <a:cxn ang="0">
+                  <a:pos x="connsiteX1" y="connsiteY1"/>
+                </a:cxn>
+                <a:cxn ang="0">
+                  <a:pos x="connsiteX2" y="connsiteY2"/>
+                </a:cxn>
+                <a:cxn ang="0">
+                  <a:pos x="connsiteX3" y="connsiteY3"/>
+                </a:cxn>
+                <a:cxn ang="0">
+                  <a:pos x="connsiteX4" y="connsiteY4"/>
+                </a:cxn>
+              </a:cxnLst>
+              <a:rect l="l" t="t" r="r" b="b"/>
+              <a:pathLst>
+                <a:path w="1462223" h="1573903">
+                  <a:moveTo>
+                    <a:pt x="371537" y="1099431"/>
+                  </a:moveTo>
+                  <a:cubicBezTo>
+                    <a:pt x="19805" y="702337"/>
+                    <a:pt x="-106890" y="236582"/>
+                    <a:pt x="89514" y="62617"/>
+                  </a:cubicBezTo>
+                  <a:cubicBezTo>
+                    <a:pt x="285918" y="-111349"/>
+                    <a:pt x="732976" y="70636"/>
+                    <a:pt x="1084707" y="467730"/>
+                  </a:cubicBezTo>
+                  <a:cubicBezTo>
+                    <a:pt x="1436440" y="864824"/>
+                    <a:pt x="1563126" y="1330579"/>
+                    <a:pt x="1366731" y="1504544"/>
+                  </a:cubicBezTo>
+                  <a:cubicBezTo>
+                    <a:pt x="1170327" y="1678510"/>
+                    <a:pt x="723269" y="1496525"/>
+                    <a:pt x="371537" y="1099431"/>
+                  </a:cubicBezTo>
+                </a:path>
+              </a:pathLst>
+            </a:custGeom>
+            <a:solidFill>
+              <a:srgbClr val="000000"/>
+            </a:solidFill>
+            <a:ln w="852" cap="flat">
+              <a:noFill/>
+              <a:prstDash val="solid"/>
+              <a:miter/>
+            </a:ln>
+          </p:spPr>
+          <p:txBody>
+            <a:bodyPr rtlCol="0" anchor="ctr"/>
+            <a:lstStyle/>
+            <a:p>
+              <a:endParaRPr lang="de-DE"/>
+            </a:p>
+          </p:txBody>
+        </p:sp>
+        <p:sp>
+          <p:nvSpPr>
+            <p:cNvPr id="14" name="Freihandform: Form 13">
+              <a:extLst>
+                <a:ext uri="{FF2B5EF4-FFF2-40B4-BE49-F238E27FC236}">
+                  <a16:creationId xmlns:a16="http://schemas.microsoft.com/office/drawing/2014/main" id="{8FD53F38-9B57-1B09-F6F4-457E94BCBCE6}"/>
+                </a:ext>
+              </a:extLst>
+            </p:cNvPr>
+            <p:cNvSpPr/>
+            <p:nvPr/>
+          </p:nvSpPr>
+          <p:spPr>
+            <a:xfrm flipV="1">
+              <a:off x="6391347" y="2731118"/>
+              <a:ext cx="1462223" cy="1573903"/>
+            </a:xfrm>
+            <a:custGeom>
+              <a:avLst/>
+              <a:gdLst>
+                <a:gd name="connsiteX0" fmla="*/ 371537 w 1462223"/>
+                <a:gd name="connsiteY0" fmla="*/ 1099431 h 1573903"/>
+                <a:gd name="connsiteX1" fmla="*/ 89514 w 1462223"/>
+                <a:gd name="connsiteY1" fmla="*/ 62617 h 1573903"/>
+                <a:gd name="connsiteX2" fmla="*/ 1084707 w 1462223"/>
+                <a:gd name="connsiteY2" fmla="*/ 467730 h 1573903"/>
+                <a:gd name="connsiteX3" fmla="*/ 1366731 w 1462223"/>
+                <a:gd name="connsiteY3" fmla="*/ 1504544 h 1573903"/>
+                <a:gd name="connsiteX4" fmla="*/ 371537 w 1462223"/>
+                <a:gd name="connsiteY4" fmla="*/ 1099431 h 1573903"/>
+              </a:gdLst>
+              <a:ahLst/>
+              <a:cxnLst>
+                <a:cxn ang="0">
+                  <a:pos x="connsiteX0" y="connsiteY0"/>
+                </a:cxn>
+                <a:cxn ang="0">
+                  <a:pos x="connsiteX1" y="connsiteY1"/>
+                </a:cxn>
+                <a:cxn ang="0">
+                  <a:pos x="connsiteX2" y="connsiteY2"/>
+                </a:cxn>
+                <a:cxn ang="0">
+                  <a:pos x="connsiteX3" y="connsiteY3"/>
+                </a:cxn>
+                <a:cxn ang="0">
+                  <a:pos x="connsiteX4" y="connsiteY4"/>
+                </a:cxn>
+              </a:cxnLst>
+              <a:rect l="l" t="t" r="r" b="b"/>
+              <a:pathLst>
+                <a:path w="1462223" h="1573903">
+                  <a:moveTo>
+                    <a:pt x="371537" y="1099431"/>
+                  </a:moveTo>
+                  <a:cubicBezTo>
+                    <a:pt x="19805" y="702337"/>
+                    <a:pt x="-106890" y="236582"/>
+                    <a:pt x="89514" y="62617"/>
+                  </a:cubicBezTo>
+                  <a:cubicBezTo>
+                    <a:pt x="285918" y="-111349"/>
+                    <a:pt x="732976" y="70636"/>
+                    <a:pt x="1084707" y="467730"/>
+                  </a:cubicBezTo>
+                  <a:cubicBezTo>
+                    <a:pt x="1436440" y="864824"/>
+                    <a:pt x="1563126" y="1330579"/>
+                    <a:pt x="1366731" y="1504544"/>
+                  </a:cubicBezTo>
+                  <a:cubicBezTo>
+                    <a:pt x="1170327" y="1678510"/>
+                    <a:pt x="723269" y="1496525"/>
+                    <a:pt x="371537" y="1099431"/>
+                  </a:cubicBezTo>
+                  <a:close/>
+                </a:path>
+              </a:pathLst>
+            </a:custGeom>
+            <a:noFill/>
+            <a:ln w="1841" cap="flat">
+              <a:solidFill>
+                <a:srgbClr val="231F20"/>
+              </a:solidFill>
+              <a:prstDash val="solid"/>
+              <a:miter/>
+            </a:ln>
+          </p:spPr>
+          <p:txBody>
+            <a:bodyPr rtlCol="0" anchor="ctr"/>
+            <a:lstStyle/>
+            <a:p>
+              <a:endParaRPr lang="de-DE"/>
+            </a:p>
+          </p:txBody>
+        </p:sp>
+      </p:grpSp>
+      <p:sp>
+        <p:nvSpPr>
+          <p:cNvPr id="21" name="Bogen 20">
+            <a:extLst>
+              <a:ext uri="{FF2B5EF4-FFF2-40B4-BE49-F238E27FC236}">
+                <a16:creationId xmlns:a16="http://schemas.microsoft.com/office/drawing/2014/main" id="{C31CBBA2-1D2D-A9BC-38CD-A60C6F3EFC68}"/>
+              </a:ext>
+            </a:extLst>
+          </p:cNvPr>
+          <p:cNvSpPr/>
+          <p:nvPr/>
+        </p:nvSpPr>
+        <p:spPr>
+          <a:xfrm>
+            <a:off x="1654675" y="2225578"/>
+            <a:ext cx="4733496" cy="5166723"/>
+          </a:xfrm>
+          <a:prstGeom prst="arc">
+            <a:avLst/>
+          </a:prstGeom>
+          <a:ln w="479425" cap="rnd">
+            <a:solidFill>
+              <a:schemeClr val="bg1"/>
+            </a:solidFill>
+          </a:ln>
+        </p:spPr>
+        <p:style>
+          <a:lnRef idx="2">
+            <a:schemeClr val="accent1"/>
+          </a:lnRef>
+          <a:fillRef idx="0">
+            <a:schemeClr val="accent1"/>
+          </a:fillRef>
+          <a:effectRef idx="1">
+            <a:schemeClr val="accent1"/>
+          </a:effectRef>
+          <a:fontRef idx="minor">
+            <a:schemeClr val="tx1"/>
+          </a:fontRef>
+        </p:style>
+        <p:txBody>
+          <a:bodyPr rtlCol="0" anchor="ctr"/>
+          <a:lstStyle/>
+          <a:p>
+            <a:pPr algn="ctr"/>
+            <a:endParaRPr lang="de-DE"/>
+          </a:p>
+        </p:txBody>
+      </p:sp>
+      <p:sp>
+        <p:nvSpPr>
+          <p:cNvPr id="22" name="Bogen 21">
+            <a:extLst>
+              <a:ext uri="{FF2B5EF4-FFF2-40B4-BE49-F238E27FC236}">
+                <a16:creationId xmlns:a16="http://schemas.microsoft.com/office/drawing/2014/main" id="{A8F1569B-31EF-04E0-D444-CA0F26D59E09}"/>
+              </a:ext>
+            </a:extLst>
+          </p:cNvPr>
+          <p:cNvSpPr/>
+          <p:nvPr/>
+        </p:nvSpPr>
+        <p:spPr>
+          <a:xfrm>
+            <a:off x="1722585" y="3164968"/>
+            <a:ext cx="3732160" cy="4073741"/>
+          </a:xfrm>
+          <a:prstGeom prst="arc">
+            <a:avLst/>
+          </a:prstGeom>
+          <a:ln w="479425" cap="rnd">
+            <a:solidFill>
+              <a:schemeClr val="bg1"/>
+            </a:solidFill>
+          </a:ln>
+        </p:spPr>
+        <p:style>
+          <a:lnRef idx="2">
+            <a:schemeClr val="accent1"/>
+          </a:lnRef>
+          <a:fillRef idx="0">
+            <a:schemeClr val="accent1"/>
+          </a:fillRef>
+          <a:effectRef idx="1">
+            <a:schemeClr val="accent1"/>
+          </a:effectRef>
+          <a:fontRef idx="minor">
+            <a:schemeClr val="tx1"/>
+          </a:fontRef>
+        </p:style>
+        <p:txBody>
+          <a:bodyPr rtlCol="0" anchor="ctr"/>
+          <a:lstStyle/>
+          <a:p>
+            <a:pPr algn="ctr"/>
+            <a:endParaRPr lang="de-DE"/>
+          </a:p>
+        </p:txBody>
+      </p:sp>
+      <p:sp>
+        <p:nvSpPr>
+          <p:cNvPr id="23" name="Bogen 22">
+            <a:extLst>
+              <a:ext uri="{FF2B5EF4-FFF2-40B4-BE49-F238E27FC236}">
+                <a16:creationId xmlns:a16="http://schemas.microsoft.com/office/drawing/2014/main" id="{3ECA192A-1EEE-3EDE-D2A6-4241D5242D11}"/>
+              </a:ext>
+            </a:extLst>
+          </p:cNvPr>
+          <p:cNvSpPr/>
+          <p:nvPr/>
+        </p:nvSpPr>
+        <p:spPr>
+          <a:xfrm>
+            <a:off x="1722585" y="4170591"/>
+            <a:ext cx="2778419" cy="3032710"/>
+          </a:xfrm>
+          <a:prstGeom prst="arc">
+            <a:avLst/>
+          </a:prstGeom>
+          <a:ln w="479425" cap="rnd">
+            <a:solidFill>
+              <a:schemeClr val="bg1"/>
+            </a:solidFill>
+          </a:ln>
+        </p:spPr>
+        <p:style>
+          <a:lnRef idx="2">
+            <a:schemeClr val="accent1"/>
+          </a:lnRef>
+          <a:fillRef idx="0">
+            <a:schemeClr val="accent1"/>
+          </a:fillRef>
+          <a:effectRef idx="1">
+            <a:schemeClr val="accent1"/>
+          </a:effectRef>
+          <a:fontRef idx="minor">
+            <a:schemeClr val="tx1"/>
+          </a:fontRef>
+        </p:style>
+        <p:txBody>
+          <a:bodyPr rtlCol="0" anchor="ctr"/>
+          <a:lstStyle/>
+          <a:p>
+            <a:pPr algn="ctr"/>
+            <a:endParaRPr lang="de-DE"/>
+          </a:p>
+        </p:txBody>
+      </p:sp>
+      <p:pic>
+        <p:nvPicPr>
+          <p:cNvPr id="25" name="Grafik 24" descr="Ein Bild, das Grafiken, Symbol, Logo, Grafikdesign enthält.&#10;&#10;Automatisch generierte Beschreibung">
+            <a:extLst>
+              <a:ext uri="{FF2B5EF4-FFF2-40B4-BE49-F238E27FC236}">
+                <a16:creationId xmlns:a16="http://schemas.microsoft.com/office/drawing/2014/main" id="{74936F8A-EF7A-954F-0B86-0B18890AD038}"/>
+              </a:ext>
+            </a:extLst>
+          </p:cNvPr>
+          <p:cNvPicPr>
+            <a:picLocks noChangeAspect="1"/>
+          </p:cNvPicPr>
+          <p:nvPr/>
+        </p:nvPicPr>
+        <p:blipFill>
+          <a:blip r:embed="rId2">
+            <a:extLst>
+              <a:ext uri="{28A0092B-C50C-407E-A947-70E740481C1C}">
+                <a14:useLocalDpi xmlns:a14="http://schemas.microsoft.com/office/drawing/2010/main" val="0"/>
+              </a:ext>
+            </a:extLst>
+          </a:blip>
+          <a:stretch>
+            <a:fillRect/>
+          </a:stretch>
+        </p:blipFill>
+        <p:spPr>
+          <a:xfrm>
+            <a:off x="11162403" y="377751"/>
+            <a:ext cx="515248" cy="515468"/>
+          </a:xfrm>
+          <a:prstGeom prst="rect">
+            <a:avLst/>
+          </a:prstGeom>
+        </p:spPr>
+      </p:pic>
+    </p:spTree>
+    <p:extLst>
+      <p:ext uri="{BB962C8B-B14F-4D97-AF65-F5344CB8AC3E}">
+        <p14:creationId xmlns:p14="http://schemas.microsoft.com/office/powerpoint/2010/main" val="2215305567"/>
+      </p:ext>
+    </p:extLst>
+  </p:cSld>
+  <p:clrMapOvr>
+    <a:masterClrMapping/>
+  </p:clrMapOvr>
+</p:sld>
+</file>
+
+<file path=ppt/slides/slide5.xml><?xml version="1.0" encoding="utf-8"?>
+<p:sld xmlns:a="http://schemas.openxmlformats.org/drawingml/2006/main" xmlns:r="http://schemas.openxmlformats.org/officeDocument/2006/relationships" xmlns:p="http://schemas.openxmlformats.org/presentationml/2006/main">
+  <p:cSld>
+    <p:bg>
+      <p:bgPr>
+        <a:solidFill>
+          <a:schemeClr val="bg1"/>
+        </a:solidFill>
+        <a:effectLst/>
+      </p:bgPr>
+    </p:bg>
+    <p:spTree>
+      <p:nvGrpSpPr>
+        <p:cNvPr id="1" name=""/>
+        <p:cNvGrpSpPr/>
+        <p:nvPr/>
+      </p:nvGrpSpPr>
+      <p:grpSpPr>
+        <a:xfrm>
+          <a:off x="0" y="0"/>
+          <a:ext cx="0" cy="0"/>
+          <a:chOff x="0" y="0"/>
+          <a:chExt cx="0" cy="0"/>
+        </a:xfrm>
+      </p:grpSpPr>
+      <p:sp>
+        <p:nvSpPr>
+          <p:cNvPr id="15" name="Rechteck: abgerundete Ecken 14">
+            <a:extLst>
+              <a:ext uri="{FF2B5EF4-FFF2-40B4-BE49-F238E27FC236}">
+                <a16:creationId xmlns:a16="http://schemas.microsoft.com/office/drawing/2014/main" id="{7EABC2F2-560C-0376-8481-BCF57ED6DAA1}"/>
+              </a:ext>
+            </a:extLst>
+          </p:cNvPr>
+          <p:cNvSpPr/>
+          <p:nvPr/>
+        </p:nvSpPr>
+        <p:spPr>
+          <a:xfrm>
+            <a:off x="2204625" y="189000"/>
+            <a:ext cx="6480000" cy="6480000"/>
+          </a:xfrm>
+          <a:prstGeom prst="roundRect">
+            <a:avLst/>
+          </a:prstGeom>
+          <a:solidFill>
+            <a:schemeClr val="tx1"/>
+          </a:solidFill>
+        </p:spPr>
+        <p:style>
+          <a:lnRef idx="2">
+            <a:schemeClr val="accent1">
+              <a:shade val="15000"/>
+            </a:schemeClr>
+          </a:lnRef>
+          <a:fillRef idx="1">
+            <a:schemeClr val="accent1"/>
+          </a:fillRef>
+          <a:effectRef idx="0">
+            <a:schemeClr val="accent1"/>
+          </a:effectRef>
+          <a:fontRef idx="minor">
+            <a:schemeClr val="lt1"/>
+          </a:fontRef>
+        </p:style>
+        <p:txBody>
+          <a:bodyPr rtlCol="0" anchor="ctr"/>
+          <a:lstStyle/>
+          <a:p>
+            <a:pPr algn="ctr"/>
+            <a:endParaRPr lang="de-DE"/>
+          </a:p>
+        </p:txBody>
+      </p:sp>
+      <p:sp>
+        <p:nvSpPr>
+          <p:cNvPr id="21" name="Bogen 20">
+            <a:extLst>
+              <a:ext uri="{FF2B5EF4-FFF2-40B4-BE49-F238E27FC236}">
+                <a16:creationId xmlns:a16="http://schemas.microsoft.com/office/drawing/2014/main" id="{C31CBBA2-1D2D-A9BC-38CD-A60C6F3EFC68}"/>
+              </a:ext>
+            </a:extLst>
+          </p:cNvPr>
+          <p:cNvSpPr/>
+          <p:nvPr/>
+        </p:nvSpPr>
+        <p:spPr>
+          <a:xfrm>
+            <a:off x="2464205" y="1594640"/>
+            <a:ext cx="4733496" cy="5166723"/>
+          </a:xfrm>
+          <a:prstGeom prst="arc">
+            <a:avLst/>
+          </a:prstGeom>
+          <a:ln w="447675" cap="rnd">
+            <a:solidFill>
+              <a:schemeClr val="bg1"/>
+            </a:solidFill>
+          </a:ln>
+        </p:spPr>
+        <p:style>
+          <a:lnRef idx="2">
+            <a:schemeClr val="accent1"/>
+          </a:lnRef>
+          <a:fillRef idx="0">
+            <a:schemeClr val="accent1"/>
+          </a:fillRef>
+          <a:effectRef idx="1">
+            <a:schemeClr val="accent1"/>
+          </a:effectRef>
+          <a:fontRef idx="minor">
+            <a:schemeClr val="tx1"/>
+          </a:fontRef>
+        </p:style>
+        <p:txBody>
+          <a:bodyPr rtlCol="0" anchor="ctr"/>
+          <a:lstStyle/>
+          <a:p>
+            <a:pPr algn="ctr"/>
+            <a:endParaRPr lang="de-DE"/>
+          </a:p>
+        </p:txBody>
+      </p:sp>
+      <p:sp>
+        <p:nvSpPr>
+          <p:cNvPr id="22" name="Bogen 21">
+            <a:extLst>
+              <a:ext uri="{FF2B5EF4-FFF2-40B4-BE49-F238E27FC236}">
+                <a16:creationId xmlns:a16="http://schemas.microsoft.com/office/drawing/2014/main" id="{A8F1569B-31EF-04E0-D444-CA0F26D59E09}"/>
+              </a:ext>
+            </a:extLst>
+          </p:cNvPr>
+          <p:cNvSpPr/>
+          <p:nvPr/>
+        </p:nvSpPr>
+        <p:spPr>
+          <a:xfrm>
+            <a:off x="2532115" y="2534030"/>
+            <a:ext cx="3732160" cy="4073741"/>
+          </a:xfrm>
+          <a:prstGeom prst="arc">
+            <a:avLst/>
+          </a:prstGeom>
+          <a:ln w="447675" cap="rnd">
+            <a:solidFill>
+              <a:schemeClr val="bg1"/>
+            </a:solidFill>
+          </a:ln>
+        </p:spPr>
+        <p:style>
+          <a:lnRef idx="2">
+            <a:schemeClr val="accent1"/>
+          </a:lnRef>
+          <a:fillRef idx="0">
+            <a:schemeClr val="accent1"/>
+          </a:fillRef>
+          <a:effectRef idx="1">
+            <a:schemeClr val="accent1"/>
+          </a:effectRef>
+          <a:fontRef idx="minor">
+            <a:schemeClr val="tx1"/>
+          </a:fontRef>
+        </p:style>
+        <p:txBody>
+          <a:bodyPr rtlCol="0" anchor="ctr"/>
+          <a:lstStyle/>
+          <a:p>
+            <a:pPr algn="ctr"/>
+            <a:endParaRPr lang="de-DE"/>
+          </a:p>
+        </p:txBody>
+      </p:sp>
+      <p:sp>
+        <p:nvSpPr>
+          <p:cNvPr id="23" name="Bogen 22">
+            <a:extLst>
+              <a:ext uri="{FF2B5EF4-FFF2-40B4-BE49-F238E27FC236}">
+                <a16:creationId xmlns:a16="http://schemas.microsoft.com/office/drawing/2014/main" id="{3ECA192A-1EEE-3EDE-D2A6-4241D5242D11}"/>
+              </a:ext>
+            </a:extLst>
+          </p:cNvPr>
+          <p:cNvSpPr/>
+          <p:nvPr/>
+        </p:nvSpPr>
+        <p:spPr>
+          <a:xfrm>
+            <a:off x="2532115" y="3539653"/>
+            <a:ext cx="2778419" cy="3032710"/>
+          </a:xfrm>
+          <a:prstGeom prst="arc">
+            <a:avLst/>
+          </a:prstGeom>
+          <a:ln w="447675" cap="rnd">
+            <a:solidFill>
+              <a:schemeClr val="bg1"/>
+            </a:solidFill>
+          </a:ln>
+        </p:spPr>
+        <p:style>
+          <a:lnRef idx="2">
+            <a:schemeClr val="accent1"/>
+          </a:lnRef>
+          <a:fillRef idx="0">
+            <a:schemeClr val="accent1"/>
+          </a:fillRef>
+          <a:effectRef idx="1">
+            <a:schemeClr val="accent1"/>
+          </a:effectRef>
+          <a:fontRef idx="minor">
+            <a:schemeClr val="tx1"/>
+          </a:fontRef>
+        </p:style>
+        <p:txBody>
+          <a:bodyPr rtlCol="0" anchor="ctr"/>
+          <a:lstStyle/>
+          <a:p>
+            <a:pPr algn="ctr"/>
+            <a:endParaRPr lang="de-DE"/>
+          </a:p>
+        </p:txBody>
+      </p:sp>
+    </p:spTree>
+    <p:extLst>
+      <p:ext uri="{BB962C8B-B14F-4D97-AF65-F5344CB8AC3E}">
+        <p14:creationId xmlns:p14="http://schemas.microsoft.com/office/powerpoint/2010/main" val="2269546380"/>
+      </p:ext>
+    </p:extLst>
+  </p:cSld>
+  <p:clrMapOvr>
+    <a:masterClrMapping/>
+  </p:clrMapOvr>
+</p:sld>
+</file>
+
+<file path=ppt/slides/slide6.xml><?xml version="1.0" encoding="utf-8"?>
+<p:sld xmlns:a="http://schemas.openxmlformats.org/drawingml/2006/main" xmlns:r="http://schemas.openxmlformats.org/officeDocument/2006/relationships" xmlns:p="http://schemas.openxmlformats.org/presentationml/2006/main">
+  <p:cSld>
     <p:spTree>
       <p:nvGrpSpPr>
         <p:cNvPr id="1" name=""/>
@@ -5864,7 +8429,7 @@
 </p:sld>
 </file>
 
-<file path=ppt/slides/slide4.xml><?xml version="1.0" encoding="utf-8"?>
+<file path=ppt/slides/slide7.xml><?xml version="1.0" encoding="utf-8"?>
 <p:sld xmlns:a="http://schemas.openxmlformats.org/drawingml/2006/main" xmlns:r="http://schemas.openxmlformats.org/officeDocument/2006/relationships" xmlns:p="http://schemas.openxmlformats.org/presentationml/2006/main">
   <p:cSld>
     <p:spTree>
@@ -6095,6 +8660,246 @@
     <p:extLst>
       <p:ext uri="{BB962C8B-B14F-4D97-AF65-F5344CB8AC3E}">
         <p14:creationId xmlns:p14="http://schemas.microsoft.com/office/powerpoint/2010/main" val="3540243787"/>
+      </p:ext>
+    </p:extLst>
+  </p:cSld>
+  <p:clrMapOvr>
+    <a:masterClrMapping/>
+  </p:clrMapOvr>
+</p:sld>
+</file>
+
+<file path=ppt/slides/slide8.xml><?xml version="1.0" encoding="utf-8"?>
+<p:sld xmlns:a="http://schemas.openxmlformats.org/drawingml/2006/main" xmlns:r="http://schemas.openxmlformats.org/officeDocument/2006/relationships" xmlns:p="http://schemas.openxmlformats.org/presentationml/2006/main">
+  <p:cSld>
+    <p:spTree>
+      <p:nvGrpSpPr>
+        <p:cNvPr id="1" name=""/>
+        <p:cNvGrpSpPr/>
+        <p:nvPr/>
+      </p:nvGrpSpPr>
+      <p:grpSpPr>
+        <a:xfrm>
+          <a:off x="0" y="0"/>
+          <a:ext cx="0" cy="0"/>
+          <a:chOff x="0" y="0"/>
+          <a:chExt cx="0" cy="0"/>
+        </a:xfrm>
+      </p:grpSpPr>
+      <p:sp>
+        <p:nvSpPr>
+          <p:cNvPr id="2" name="Rechteck 1">
+            <a:extLst>
+              <a:ext uri="{FF2B5EF4-FFF2-40B4-BE49-F238E27FC236}">
+                <a16:creationId xmlns:a16="http://schemas.microsoft.com/office/drawing/2014/main" id="{3D641B86-1B81-C723-0AF7-82E1A6A14678}"/>
+              </a:ext>
+            </a:extLst>
+          </p:cNvPr>
+          <p:cNvSpPr/>
+          <p:nvPr/>
+        </p:nvSpPr>
+        <p:spPr>
+          <a:xfrm>
+            <a:off x="4493646" y="2038349"/>
+            <a:ext cx="3686400" cy="1800000"/>
+          </a:xfrm>
+          <a:prstGeom prst="rect">
+            <a:avLst/>
+          </a:prstGeom>
+          <a:solidFill>
+            <a:srgbClr val="0D1117"/>
+          </a:solidFill>
+          <a:ln>
+            <a:noFill/>
+          </a:ln>
+        </p:spPr>
+        <p:style>
+          <a:lnRef idx="2">
+            <a:schemeClr val="accent1">
+              <a:shade val="15000"/>
+            </a:schemeClr>
+          </a:lnRef>
+          <a:fillRef idx="1">
+            <a:schemeClr val="accent1"/>
+          </a:fillRef>
+          <a:effectRef idx="0">
+            <a:schemeClr val="accent1"/>
+          </a:effectRef>
+          <a:fontRef idx="minor">
+            <a:schemeClr val="lt1"/>
+          </a:fontRef>
+        </p:style>
+        <p:txBody>
+          <a:bodyPr rtlCol="0" anchor="ctr"/>
+          <a:lstStyle/>
+          <a:p>
+            <a:pPr algn="ctr"/>
+            <a:endParaRPr lang="de-DE"/>
+          </a:p>
+        </p:txBody>
+      </p:sp>
+      <p:pic>
+        <p:nvPicPr>
+          <p:cNvPr id="4" name="Grafik 3" descr="Ein Bild, das Text, Menschliches Gesicht, Screenshot, Person enthält.&#10;&#10;Automatisch generierte Beschreibung">
+            <a:extLst>
+              <a:ext uri="{FF2B5EF4-FFF2-40B4-BE49-F238E27FC236}">
+                <a16:creationId xmlns:a16="http://schemas.microsoft.com/office/drawing/2014/main" id="{4A4A552C-A0B2-ADE9-4D47-D5FB07C9C224}"/>
+              </a:ext>
+            </a:extLst>
+          </p:cNvPr>
+          <p:cNvPicPr>
+            <a:picLocks noChangeAspect="1"/>
+          </p:cNvPicPr>
+          <p:nvPr/>
+        </p:nvPicPr>
+        <p:blipFill>
+          <a:blip r:embed="rId2">
+            <a:extLst>
+              <a:ext uri="{28A0092B-C50C-407E-A947-70E740481C1C}">
+                <a14:useLocalDpi xmlns:a14="http://schemas.microsoft.com/office/drawing/2010/main" val="0"/>
+              </a:ext>
+            </a:extLst>
+          </a:blip>
+          <a:stretch>
+            <a:fillRect/>
+          </a:stretch>
+        </p:blipFill>
+        <p:spPr>
+          <a:xfrm>
+            <a:off x="4663961" y="2038349"/>
+            <a:ext cx="877705" cy="1797539"/>
+          </a:xfrm>
+          <a:prstGeom prst="rect">
+            <a:avLst/>
+          </a:prstGeom>
+        </p:spPr>
+      </p:pic>
+      <p:sp>
+        <p:nvSpPr>
+          <p:cNvPr id="5" name="Pfeil: nach rechts 4">
+            <a:extLst>
+              <a:ext uri="{FF2B5EF4-FFF2-40B4-BE49-F238E27FC236}">
+                <a16:creationId xmlns:a16="http://schemas.microsoft.com/office/drawing/2014/main" id="{2C8D0CB5-4EEB-8873-D8B4-B0172CB5440E}"/>
+              </a:ext>
+            </a:extLst>
+          </p:cNvPr>
+          <p:cNvSpPr/>
+          <p:nvPr/>
+        </p:nvSpPr>
+        <p:spPr>
+          <a:xfrm>
+            <a:off x="5689939" y="2586970"/>
+            <a:ext cx="306475" cy="211015"/>
+          </a:xfrm>
+          <a:prstGeom prst="rightArrow">
+            <a:avLst/>
+          </a:prstGeom>
+        </p:spPr>
+        <p:style>
+          <a:lnRef idx="2">
+            <a:schemeClr val="accent2">
+              <a:shade val="15000"/>
+            </a:schemeClr>
+          </a:lnRef>
+          <a:fillRef idx="1">
+            <a:schemeClr val="accent2"/>
+          </a:fillRef>
+          <a:effectRef idx="0">
+            <a:schemeClr val="accent2"/>
+          </a:effectRef>
+          <a:fontRef idx="minor">
+            <a:schemeClr val="lt1"/>
+          </a:fontRef>
+        </p:style>
+        <p:txBody>
+          <a:bodyPr rtlCol="0" anchor="ctr"/>
+          <a:lstStyle/>
+          <a:p>
+            <a:pPr algn="ctr"/>
+            <a:endParaRPr lang="de-DE"/>
+          </a:p>
+        </p:txBody>
+      </p:sp>
+      <p:sp>
+        <p:nvSpPr>
+          <p:cNvPr id="6" name="Pfeil: nach rechts 5">
+            <a:extLst>
+              <a:ext uri="{FF2B5EF4-FFF2-40B4-BE49-F238E27FC236}">
+                <a16:creationId xmlns:a16="http://schemas.microsoft.com/office/drawing/2014/main" id="{1026C02D-393A-EA59-1237-FC2DF4024EC6}"/>
+              </a:ext>
+            </a:extLst>
+          </p:cNvPr>
+          <p:cNvSpPr/>
+          <p:nvPr/>
+        </p:nvSpPr>
+        <p:spPr>
+          <a:xfrm rot="10800000">
+            <a:off x="5665596" y="2869221"/>
+            <a:ext cx="306475" cy="211015"/>
+          </a:xfrm>
+          <a:prstGeom prst="rightArrow">
+            <a:avLst/>
+          </a:prstGeom>
+        </p:spPr>
+        <p:style>
+          <a:lnRef idx="2">
+            <a:schemeClr val="accent2">
+              <a:shade val="15000"/>
+            </a:schemeClr>
+          </a:lnRef>
+          <a:fillRef idx="1">
+            <a:schemeClr val="accent2"/>
+          </a:fillRef>
+          <a:effectRef idx="0">
+            <a:schemeClr val="accent2"/>
+          </a:effectRef>
+          <a:fontRef idx="minor">
+            <a:schemeClr val="lt1"/>
+          </a:fontRef>
+        </p:style>
+        <p:txBody>
+          <a:bodyPr rtlCol="0" anchor="ctr"/>
+          <a:lstStyle/>
+          <a:p>
+            <a:pPr algn="ctr"/>
+            <a:endParaRPr lang="de-DE"/>
+          </a:p>
+        </p:txBody>
+      </p:sp>
+      <p:pic>
+        <p:nvPicPr>
+          <p:cNvPr id="8" name="Grafik 7">
+            <a:extLst>
+              <a:ext uri="{FF2B5EF4-FFF2-40B4-BE49-F238E27FC236}">
+                <a16:creationId xmlns:a16="http://schemas.microsoft.com/office/drawing/2014/main" id="{EAB5A4DB-B83D-0B2A-9764-A77514A5BA6F}"/>
+              </a:ext>
+            </a:extLst>
+          </p:cNvPr>
+          <p:cNvPicPr>
+            <a:picLocks noChangeAspect="1"/>
+          </p:cNvPicPr>
+          <p:nvPr/>
+        </p:nvPicPr>
+        <p:blipFill>
+          <a:blip r:embed="rId3"/>
+          <a:stretch>
+            <a:fillRect/>
+          </a:stretch>
+        </p:blipFill>
+        <p:spPr>
+          <a:xfrm>
+            <a:off x="6096001" y="2038349"/>
+            <a:ext cx="1952850" cy="1797628"/>
+          </a:xfrm>
+          <a:prstGeom prst="rect">
+            <a:avLst/>
+          </a:prstGeom>
+        </p:spPr>
+      </p:pic>
+    </p:spTree>
+    <p:extLst>
+      <p:ext uri="{BB962C8B-B14F-4D97-AF65-F5344CB8AC3E}">
+        <p14:creationId xmlns:p14="http://schemas.microsoft.com/office/powerpoint/2010/main" val="85536137"/>
       </p:ext>
     </p:extLst>
   </p:cSld>

</xml_diff>